<commit_message>
Update Course Intro slides
</commit_message>
<xml_diff>
--- a/modules/PPT/CourseIntro.pptx
+++ b/modules/PPT/CourseIntro.pptx
@@ -5,15 +5,10 @@
     <p:sldMasterId id="2147483648" r:id="rId1"/>
   </p:sldMasterIdLst>
   <p:notesMasterIdLst>
-    <p:notesMasterId r:id="rId8"/>
+    <p:notesMasterId r:id="rId3"/>
   </p:notesMasterIdLst>
   <p:sldIdLst>
-    <p:sldId id="282" r:id="rId2"/>
-    <p:sldId id="262" r:id="rId3"/>
-    <p:sldId id="261" r:id="rId4"/>
-    <p:sldId id="284" r:id="rId5"/>
-    <p:sldId id="285" r:id="rId6"/>
-    <p:sldId id="283" r:id="rId7"/>
+    <p:sldId id="276" r:id="rId2"/>
   </p:sldIdLst>
   <p:sldSz cx="9144000" cy="6858000" type="screen4x3"/>
   <p:notesSz cx="6858000" cy="9144000"/>
@@ -475,7 +470,7 @@
             <a:pPr>
               <a:defRPr/>
             </a:pPr>
-            <a:fld id="{A2E2256A-A507-439D-B2F3-19A96F092749}" type="slidenum">
+            <a:fld id="{F0EDB3E7-DD78-4A95-B5AA-6C1EE68AF305}" type="slidenum">
               <a:rPr lang="en-US"/>
               <a:pPr>
                 <a:defRPr/>
@@ -489,7 +484,7 @@
     </p:spTree>
     <p:extLst>
       <p:ext uri="{BB962C8B-B14F-4D97-AF65-F5344CB8AC3E}">
-        <p14:creationId xmlns:p14="http://schemas.microsoft.com/office/powerpoint/2010/main" val="4204907100"/>
+        <p14:creationId xmlns:p14="http://schemas.microsoft.com/office/powerpoint/2010/main" val="1413029072"/>
       </p:ext>
     </p:extLst>
   </p:cSld>
@@ -663,25 +658,6 @@
           <a:bodyPr/>
           <a:lstStyle/>
           <a:p>
-            <a:pPr eaLnBrk="1" hangingPunct="1"/>
-            <a:r>
-              <a:rPr lang="en-US" dirty="0" smtClean="0"/>
-              <a:t>Key concepts …</a:t>
-            </a:r>
-            <a:r>
-              <a:rPr lang="en-US" baseline="0" dirty="0" smtClean="0"/>
-              <a:t> (1) </a:t>
-            </a:r>
-            <a:r>
-              <a:rPr lang="en-US" dirty="0" smtClean="0"/>
-              <a:t>Closed (simplifies) and (2) Identifies unit for management and analysis (i.e., statistical population).</a:t>
-            </a:r>
-          </a:p>
-          <a:p>
-            <a:pPr eaLnBrk="1" hangingPunct="1"/>
-            <a:endParaRPr lang="en-US" dirty="0" smtClean="0"/>
-          </a:p>
-          <a:p>
             <a:endParaRPr lang="en-US" dirty="0"/>
           </a:p>
         </p:txBody>
@@ -710,217 +686,6 @@
                 <a:defRPr/>
               </a:pPr>
               <a:t>1</a:t>
-            </a:fld>
-            <a:endParaRPr lang="en-US"/>
-          </a:p>
-        </p:txBody>
-      </p:sp>
-    </p:spTree>
-    <p:extLst>
-      <p:ext uri="{BB962C8B-B14F-4D97-AF65-F5344CB8AC3E}">
-        <p14:creationId xmlns:p14="http://schemas.microsoft.com/office/powerpoint/2010/main" val="3793606867"/>
-      </p:ext>
-    </p:extLst>
-  </p:cSld>
-  <p:clrMapOvr>
-    <a:masterClrMapping/>
-  </p:clrMapOvr>
-</p:notes>
-</file>
-
-<file path=ppt/notesSlides/notesSlide2.xml><?xml version="1.0" encoding="utf-8"?>
-<p:notes xmlns:a="http://schemas.openxmlformats.org/drawingml/2006/main" xmlns:r="http://schemas.openxmlformats.org/officeDocument/2006/relationships" xmlns:p="http://schemas.openxmlformats.org/presentationml/2006/main">
-  <p:cSld>
-    <p:spTree>
-      <p:nvGrpSpPr>
-        <p:cNvPr id="1" name=""/>
-        <p:cNvGrpSpPr/>
-        <p:nvPr/>
-      </p:nvGrpSpPr>
-      <p:grpSpPr>
-        <a:xfrm>
-          <a:off x="0" y="0"/>
-          <a:ext cx="0" cy="0"/>
-          <a:chOff x="0" y="0"/>
-          <a:chExt cx="0" cy="0"/>
-        </a:xfrm>
-      </p:grpSpPr>
-      <p:sp>
-        <p:nvSpPr>
-          <p:cNvPr id="2" name="Slide Image Placeholder 1"/>
-          <p:cNvSpPr>
-            <a:spLocks noGrp="1" noRot="1" noChangeAspect="1"/>
-          </p:cNvSpPr>
-          <p:nvPr>
-            <p:ph type="sldImg"/>
-          </p:nvPr>
-        </p:nvSpPr>
-        <p:spPr/>
-      </p:sp>
-      <p:sp>
-        <p:nvSpPr>
-          <p:cNvPr id="3" name="Notes Placeholder 2"/>
-          <p:cNvSpPr>
-            <a:spLocks noGrp="1"/>
-          </p:cNvSpPr>
-          <p:nvPr>
-            <p:ph type="body" idx="1"/>
-          </p:nvPr>
-        </p:nvSpPr>
-        <p:spPr/>
-        <p:txBody>
-          <a:bodyPr/>
-          <a:lstStyle/>
-          <a:p>
-            <a:pPr marL="0" marR="0" indent="0" algn="l" defTabSz="914400" rtl="0" eaLnBrk="0" fontAlgn="base" latinLnBrk="0" hangingPunct="0">
-              <a:lnSpc>
-                <a:spcPct val="100000"/>
-              </a:lnSpc>
-              <a:spcBef>
-                <a:spcPct val="30000"/>
-              </a:spcBef>
-              <a:spcAft>
-                <a:spcPct val="0"/>
-              </a:spcAft>
-              <a:buClrTx/>
-              <a:buSzTx/>
-              <a:buFontTx/>
-              <a:buNone/>
-              <a:tabLst/>
-              <a:defRPr/>
-            </a:pPr>
-            <a:r>
-              <a:rPr lang="en-US" dirty="0" smtClean="0"/>
-              <a:t>Measure things (size, age </a:t>
-            </a:r>
-            <a:r>
-              <a:rPr lang="en-US" dirty="0" err="1" smtClean="0"/>
-              <a:t>strux</a:t>
-            </a:r>
-            <a:r>
-              <a:rPr lang="en-US" dirty="0" smtClean="0"/>
-              <a:t>) on population box, make inferences about processes leading in and out.</a:t>
-            </a:r>
-          </a:p>
-          <a:p>
-            <a:endParaRPr lang="en-US" dirty="0"/>
-          </a:p>
-        </p:txBody>
-      </p:sp>
-      <p:sp>
-        <p:nvSpPr>
-          <p:cNvPr id="4" name="Slide Number Placeholder 3"/>
-          <p:cNvSpPr>
-            <a:spLocks noGrp="1"/>
-          </p:cNvSpPr>
-          <p:nvPr>
-            <p:ph type="sldNum" sz="quarter" idx="10"/>
-          </p:nvPr>
-        </p:nvSpPr>
-        <p:spPr/>
-        <p:txBody>
-          <a:bodyPr/>
-          <a:lstStyle/>
-          <a:p>
-            <a:pPr>
-              <a:defRPr/>
-            </a:pPr>
-            <a:fld id="{A2E2256A-A507-439D-B2F3-19A96F092749}" type="slidenum">
-              <a:rPr lang="en-US" smtClean="0"/>
-              <a:pPr>
-                <a:defRPr/>
-              </a:pPr>
-              <a:t>2</a:t>
-            </a:fld>
-            <a:endParaRPr lang="en-US"/>
-          </a:p>
-        </p:txBody>
-      </p:sp>
-    </p:spTree>
-    <p:extLst>
-      <p:ext uri="{BB962C8B-B14F-4D97-AF65-F5344CB8AC3E}">
-        <p14:creationId xmlns:p14="http://schemas.microsoft.com/office/powerpoint/2010/main" val="1855777151"/>
-      </p:ext>
-    </p:extLst>
-  </p:cSld>
-  <p:clrMapOvr>
-    <a:masterClrMapping/>
-  </p:clrMapOvr>
-</p:notes>
-</file>
-
-<file path=ppt/notesSlides/notesSlide3.xml><?xml version="1.0" encoding="utf-8"?>
-<p:notes xmlns:a="http://schemas.openxmlformats.org/drawingml/2006/main" xmlns:r="http://schemas.openxmlformats.org/officeDocument/2006/relationships" xmlns:p="http://schemas.openxmlformats.org/presentationml/2006/main">
-  <p:cSld>
-    <p:spTree>
-      <p:nvGrpSpPr>
-        <p:cNvPr id="1" name=""/>
-        <p:cNvGrpSpPr/>
-        <p:nvPr/>
-      </p:nvGrpSpPr>
-      <p:grpSpPr>
-        <a:xfrm>
-          <a:off x="0" y="0"/>
-          <a:ext cx="0" cy="0"/>
-          <a:chOff x="0" y="0"/>
-          <a:chExt cx="0" cy="0"/>
-        </a:xfrm>
-      </p:grpSpPr>
-      <p:sp>
-        <p:nvSpPr>
-          <p:cNvPr id="2" name="Slide Image Placeholder 1"/>
-          <p:cNvSpPr>
-            <a:spLocks noGrp="1" noRot="1" noChangeAspect="1"/>
-          </p:cNvSpPr>
-          <p:nvPr>
-            <p:ph type="sldImg"/>
-          </p:nvPr>
-        </p:nvSpPr>
-        <p:spPr/>
-      </p:sp>
-      <p:sp>
-        <p:nvSpPr>
-          <p:cNvPr id="3" name="Notes Placeholder 2"/>
-          <p:cNvSpPr>
-            <a:spLocks noGrp="1"/>
-          </p:cNvSpPr>
-          <p:nvPr>
-            <p:ph type="body" idx="1"/>
-          </p:nvPr>
-        </p:nvSpPr>
-        <p:spPr/>
-        <p:txBody>
-          <a:bodyPr/>
-          <a:lstStyle/>
-          <a:p>
-            <a:endParaRPr lang="en-US" dirty="0"/>
-          </a:p>
-        </p:txBody>
-      </p:sp>
-      <p:sp>
-        <p:nvSpPr>
-          <p:cNvPr id="4" name="Slide Number Placeholder 3"/>
-          <p:cNvSpPr>
-            <a:spLocks noGrp="1"/>
-          </p:cNvSpPr>
-          <p:nvPr>
-            <p:ph type="sldNum" sz="quarter" idx="10"/>
-          </p:nvPr>
-        </p:nvSpPr>
-        <p:spPr/>
-        <p:txBody>
-          <a:bodyPr/>
-          <a:lstStyle/>
-          <a:p>
-            <a:pPr>
-              <a:defRPr/>
-            </a:pPr>
-            <a:fld id="{A2E2256A-A507-439D-B2F3-19A96F092749}" type="slidenum">
-              <a:rPr lang="en-US" smtClean="0"/>
-              <a:pPr>
-                <a:defRPr/>
-              </a:pPr>
-              <a:t>3</a:t>
             </a:fld>
             <a:endParaRPr lang="en-US"/>
           </a:p>
@@ -1074,10 +839,9 @@
               <a:defRPr/>
             </a:pPr>
             <a:r>
-              <a:rPr lang="en-US" smtClean="0"/>
-              <a:t>Stock Concept</a:t>
-            </a:r>
-            <a:endParaRPr lang="en-US"/>
+              <a:rPr lang="en-US"/>
+              <a:t>Introduction</a:t>
+            </a:r>
           </a:p>
         </p:txBody>
       </p:sp>
@@ -1105,7 +869,7 @@
             <a:pPr>
               <a:defRPr/>
             </a:pPr>
-            <a:fld id="{432921C4-142D-4586-BEC6-0741974F0675}" type="slidenum">
+            <a:fld id="{A4E94F06-84EE-4A28-BBCC-E2EBFB03413E}" type="slidenum">
               <a:rPr lang="en-US"/>
               <a:pPr>
                 <a:defRPr/>
@@ -1119,7 +883,7 @@
     </p:spTree>
     <p:extLst>
       <p:ext uri="{BB962C8B-B14F-4D97-AF65-F5344CB8AC3E}">
-        <p14:creationId xmlns:p14="http://schemas.microsoft.com/office/powerpoint/2010/main" val="4165892915"/>
+        <p14:creationId xmlns:p14="http://schemas.microsoft.com/office/powerpoint/2010/main" val="2621500176"/>
       </p:ext>
     </p:extLst>
   </p:cSld>
@@ -1246,10 +1010,9 @@
               <a:defRPr/>
             </a:pPr>
             <a:r>
-              <a:rPr lang="en-US" smtClean="0"/>
-              <a:t>Stock Concept</a:t>
-            </a:r>
-            <a:endParaRPr lang="en-US"/>
+              <a:rPr lang="en-US"/>
+              <a:t>Introduction</a:t>
+            </a:r>
           </a:p>
         </p:txBody>
       </p:sp>
@@ -1277,7 +1040,7 @@
             <a:pPr>
               <a:defRPr/>
             </a:pPr>
-            <a:fld id="{8C57618D-78D1-4116-AB13-1C79B6A72BE6}" type="slidenum">
+            <a:fld id="{234E56C9-F744-4A58-8EDD-57C96B8E23DA}" type="slidenum">
               <a:rPr lang="en-US"/>
               <a:pPr>
                 <a:defRPr/>
@@ -1291,7 +1054,7 @@
     </p:spTree>
     <p:extLst>
       <p:ext uri="{BB962C8B-B14F-4D97-AF65-F5344CB8AC3E}">
-        <p14:creationId xmlns:p14="http://schemas.microsoft.com/office/powerpoint/2010/main" val="158332621"/>
+        <p14:creationId xmlns:p14="http://schemas.microsoft.com/office/powerpoint/2010/main" val="2565148303"/>
       </p:ext>
     </p:extLst>
   </p:cSld>
@@ -1428,10 +1191,9 @@
               <a:defRPr/>
             </a:pPr>
             <a:r>
-              <a:rPr lang="en-US" smtClean="0"/>
-              <a:t>Stock Concept</a:t>
-            </a:r>
-            <a:endParaRPr lang="en-US"/>
+              <a:rPr lang="en-US"/>
+              <a:t>Introduction</a:t>
+            </a:r>
           </a:p>
         </p:txBody>
       </p:sp>
@@ -1459,7 +1221,7 @@
             <a:pPr>
               <a:defRPr/>
             </a:pPr>
-            <a:fld id="{35653D9B-0C64-4C56-A58E-17E68AB86F7D}" type="slidenum">
+            <a:fld id="{264150D2-6DEC-4A9A-83F0-6B959CC41CAC}" type="slidenum">
               <a:rPr lang="en-US"/>
               <a:pPr>
                 <a:defRPr/>
@@ -1473,7 +1235,7 @@
     </p:spTree>
     <p:extLst>
       <p:ext uri="{BB962C8B-B14F-4D97-AF65-F5344CB8AC3E}">
-        <p14:creationId xmlns:p14="http://schemas.microsoft.com/office/powerpoint/2010/main" val="2278598756"/>
+        <p14:creationId xmlns:p14="http://schemas.microsoft.com/office/powerpoint/2010/main" val="2480030755"/>
       </p:ext>
     </p:extLst>
   </p:cSld>
@@ -1600,10 +1362,9 @@
               <a:defRPr/>
             </a:pPr>
             <a:r>
-              <a:rPr lang="en-US" smtClean="0"/>
-              <a:t>Stock Concept</a:t>
-            </a:r>
-            <a:endParaRPr lang="en-US"/>
+              <a:rPr lang="en-US"/>
+              <a:t>Introduction</a:t>
+            </a:r>
           </a:p>
         </p:txBody>
       </p:sp>
@@ -1631,7 +1392,7 @@
             <a:pPr>
               <a:defRPr/>
             </a:pPr>
-            <a:fld id="{A4C5663D-8A97-4D07-AE54-B897400713C4}" type="slidenum">
+            <a:fld id="{C6A2F5B4-2197-4B8F-A126-FB2FF53A65C9}" type="slidenum">
               <a:rPr lang="en-US"/>
               <a:pPr>
                 <a:defRPr/>
@@ -1645,7 +1406,7 @@
     </p:spTree>
     <p:extLst>
       <p:ext uri="{BB962C8B-B14F-4D97-AF65-F5344CB8AC3E}">
-        <p14:creationId xmlns:p14="http://schemas.microsoft.com/office/powerpoint/2010/main" val="1788541770"/>
+        <p14:creationId xmlns:p14="http://schemas.microsoft.com/office/powerpoint/2010/main" val="2661103020"/>
       </p:ext>
     </p:extLst>
   </p:cSld>
@@ -1794,10 +1555,9 @@
               <a:defRPr/>
             </a:pPr>
             <a:r>
-              <a:rPr lang="en-US" smtClean="0"/>
-              <a:t>Stock Concept</a:t>
-            </a:r>
-            <a:endParaRPr lang="en-US"/>
+              <a:rPr lang="en-US"/>
+              <a:t>Introduction</a:t>
+            </a:r>
           </a:p>
         </p:txBody>
       </p:sp>
@@ -1825,7 +1585,7 @@
             <a:pPr>
               <a:defRPr/>
             </a:pPr>
-            <a:fld id="{DB492704-2498-4503-9ED8-6BB0E8689CD7}" type="slidenum">
+            <a:fld id="{CC481BBB-998C-4D5A-B477-FEEE530C3F94}" type="slidenum">
               <a:rPr lang="en-US"/>
               <a:pPr>
                 <a:defRPr/>
@@ -1839,7 +1599,7 @@
     </p:spTree>
     <p:extLst>
       <p:ext uri="{BB962C8B-B14F-4D97-AF65-F5344CB8AC3E}">
-        <p14:creationId xmlns:p14="http://schemas.microsoft.com/office/powerpoint/2010/main" val="2179879514"/>
+        <p14:creationId xmlns:p14="http://schemas.microsoft.com/office/powerpoint/2010/main" val="3159692553"/>
       </p:ext>
     </p:extLst>
   </p:cSld>
@@ -2084,10 +1844,9 @@
               <a:defRPr/>
             </a:pPr>
             <a:r>
-              <a:rPr lang="en-US" smtClean="0"/>
-              <a:t>Stock Concept</a:t>
-            </a:r>
-            <a:endParaRPr lang="en-US"/>
+              <a:rPr lang="en-US"/>
+              <a:t>Introduction</a:t>
+            </a:r>
           </a:p>
         </p:txBody>
       </p:sp>
@@ -2115,7 +1874,7 @@
             <a:pPr>
               <a:defRPr/>
             </a:pPr>
-            <a:fld id="{627FD797-7CC2-456C-80DA-DEF1C45A6A8F}" type="slidenum">
+            <a:fld id="{621102C8-613A-4420-8C27-360BC9888DFD}" type="slidenum">
               <a:rPr lang="en-US"/>
               <a:pPr>
                 <a:defRPr/>
@@ -2129,7 +1888,7 @@
     </p:spTree>
     <p:extLst>
       <p:ext uri="{BB962C8B-B14F-4D97-AF65-F5344CB8AC3E}">
-        <p14:creationId xmlns:p14="http://schemas.microsoft.com/office/powerpoint/2010/main" val="1591148372"/>
+        <p14:creationId xmlns:p14="http://schemas.microsoft.com/office/powerpoint/2010/main" val="3800594216"/>
       </p:ext>
     </p:extLst>
   </p:cSld>
@@ -2513,10 +2272,9 @@
               <a:defRPr/>
             </a:pPr>
             <a:r>
-              <a:rPr lang="en-US" smtClean="0"/>
-              <a:t>Stock Concept</a:t>
-            </a:r>
-            <a:endParaRPr lang="en-US"/>
+              <a:rPr lang="en-US"/>
+              <a:t>Introduction</a:t>
+            </a:r>
           </a:p>
         </p:txBody>
       </p:sp>
@@ -2544,7 +2302,7 @@
             <a:pPr>
               <a:defRPr/>
             </a:pPr>
-            <a:fld id="{30CE72A1-FC53-46FE-93D9-174500D4FF81}" type="slidenum">
+            <a:fld id="{068D1941-5536-4571-800A-61F1AF2F69F5}" type="slidenum">
               <a:rPr lang="en-US"/>
               <a:pPr>
                 <a:defRPr/>
@@ -2558,7 +2316,7 @@
     </p:spTree>
     <p:extLst>
       <p:ext uri="{BB962C8B-B14F-4D97-AF65-F5344CB8AC3E}">
-        <p14:creationId xmlns:p14="http://schemas.microsoft.com/office/powerpoint/2010/main" val="636758979"/>
+        <p14:creationId xmlns:p14="http://schemas.microsoft.com/office/powerpoint/2010/main" val="1634440809"/>
       </p:ext>
     </p:extLst>
   </p:cSld>
@@ -2633,10 +2391,9 @@
               <a:defRPr/>
             </a:pPr>
             <a:r>
-              <a:rPr lang="en-US" smtClean="0"/>
-              <a:t>Stock Concept</a:t>
-            </a:r>
-            <a:endParaRPr lang="en-US"/>
+              <a:rPr lang="en-US"/>
+              <a:t>Introduction</a:t>
+            </a:r>
           </a:p>
         </p:txBody>
       </p:sp>
@@ -2664,7 +2421,7 @@
             <a:pPr>
               <a:defRPr/>
             </a:pPr>
-            <a:fld id="{966F755C-69D8-402B-9507-AD7737380BC8}" type="slidenum">
+            <a:fld id="{107484E7-B315-4398-A2CA-0206B54ABD9A}" type="slidenum">
               <a:rPr lang="en-US"/>
               <a:pPr>
                 <a:defRPr/>
@@ -2678,7 +2435,7 @@
     </p:spTree>
     <p:extLst>
       <p:ext uri="{BB962C8B-B14F-4D97-AF65-F5344CB8AC3E}">
-        <p14:creationId xmlns:p14="http://schemas.microsoft.com/office/powerpoint/2010/main" val="572330567"/>
+        <p14:creationId xmlns:p14="http://schemas.microsoft.com/office/powerpoint/2010/main" val="977175642"/>
       </p:ext>
     </p:extLst>
   </p:cSld>
@@ -2730,10 +2487,9 @@
               <a:defRPr/>
             </a:pPr>
             <a:r>
-              <a:rPr lang="en-US" smtClean="0"/>
-              <a:t>Stock Concept</a:t>
-            </a:r>
-            <a:endParaRPr lang="en-US"/>
+              <a:rPr lang="en-US"/>
+              <a:t>Introduction</a:t>
+            </a:r>
           </a:p>
         </p:txBody>
       </p:sp>
@@ -2761,7 +2517,7 @@
             <a:pPr>
               <a:defRPr/>
             </a:pPr>
-            <a:fld id="{1A91B5CC-F5E5-404A-8C0E-23A8CD317734}" type="slidenum">
+            <a:fld id="{66BB13D9-7DD3-4926-8C30-3405562D120D}" type="slidenum">
               <a:rPr lang="en-US"/>
               <a:pPr>
                 <a:defRPr/>
@@ -2775,7 +2531,7 @@
     </p:spTree>
     <p:extLst>
       <p:ext uri="{BB962C8B-B14F-4D97-AF65-F5344CB8AC3E}">
-        <p14:creationId xmlns:p14="http://schemas.microsoft.com/office/powerpoint/2010/main" val="3990091837"/>
+        <p14:creationId xmlns:p14="http://schemas.microsoft.com/office/powerpoint/2010/main" val="2165138593"/>
       </p:ext>
     </p:extLst>
   </p:cSld>
@@ -3009,10 +2765,9 @@
               <a:defRPr/>
             </a:pPr>
             <a:r>
-              <a:rPr lang="en-US" smtClean="0"/>
-              <a:t>Stock Concept</a:t>
-            </a:r>
-            <a:endParaRPr lang="en-US"/>
+              <a:rPr lang="en-US"/>
+              <a:t>Introduction</a:t>
+            </a:r>
           </a:p>
         </p:txBody>
       </p:sp>
@@ -3040,7 +2795,7 @@
             <a:pPr>
               <a:defRPr/>
             </a:pPr>
-            <a:fld id="{7ED1C83D-FE48-4741-9855-EE28842135B2}" type="slidenum">
+            <a:fld id="{B5BBDC8C-4DC6-487A-BC88-B44DDC680E55}" type="slidenum">
               <a:rPr lang="en-US"/>
               <a:pPr>
                 <a:defRPr/>
@@ -3054,7 +2809,7 @@
     </p:spTree>
     <p:extLst>
       <p:ext uri="{BB962C8B-B14F-4D97-AF65-F5344CB8AC3E}">
-        <p14:creationId xmlns:p14="http://schemas.microsoft.com/office/powerpoint/2010/main" val="3300565037"/>
+        <p14:creationId xmlns:p14="http://schemas.microsoft.com/office/powerpoint/2010/main" val="1600640963"/>
       </p:ext>
     </p:extLst>
   </p:cSld>
@@ -3265,10 +3020,9 @@
               <a:defRPr/>
             </a:pPr>
             <a:r>
-              <a:rPr lang="en-US" smtClean="0"/>
-              <a:t>Stock Concept</a:t>
-            </a:r>
-            <a:endParaRPr lang="en-US"/>
+              <a:rPr lang="en-US"/>
+              <a:t>Introduction</a:t>
+            </a:r>
           </a:p>
         </p:txBody>
       </p:sp>
@@ -3296,7 +3050,7 @@
             <a:pPr>
               <a:defRPr/>
             </a:pPr>
-            <a:fld id="{A7473D10-B092-43DF-AB16-B5D9BE98A38A}" type="slidenum">
+            <a:fld id="{BCF08F23-D14C-4AEC-A9B2-37245BAA82A8}" type="slidenum">
               <a:rPr lang="en-US"/>
               <a:pPr>
                 <a:defRPr/>
@@ -3310,7 +3064,7 @@
     </p:spTree>
     <p:extLst>
       <p:ext uri="{BB962C8B-B14F-4D97-AF65-F5344CB8AC3E}">
-        <p14:creationId xmlns:p14="http://schemas.microsoft.com/office/powerpoint/2010/main" val="4232721682"/>
+        <p14:creationId xmlns:p14="http://schemas.microsoft.com/office/powerpoint/2010/main" val="550919038"/>
       </p:ext>
     </p:extLst>
   </p:cSld>
@@ -3586,10 +3340,9 @@
               <a:defRPr/>
             </a:pPr>
             <a:r>
-              <a:rPr lang="en-US" smtClean="0"/>
-              <a:t>Stock Concept</a:t>
-            </a:r>
-            <a:endParaRPr lang="en-US"/>
+              <a:rPr lang="en-US"/>
+              <a:t>Introduction</a:t>
+            </a:r>
           </a:p>
         </p:txBody>
       </p:sp>
@@ -3635,7 +3388,7 @@
             <a:pPr>
               <a:defRPr/>
             </a:pPr>
-            <a:fld id="{0A8A53C9-4343-4344-A1E0-137A7B6CFC35}" type="slidenum">
+            <a:fld id="{0F185031-A3CA-4D3D-B9A6-A0AC09B1AF46}" type="slidenum">
               <a:rPr lang="en-US"/>
               <a:pPr>
                 <a:defRPr/>
@@ -4051,620 +3804,6 @@
       </p:grpSpPr>
       <p:sp>
         <p:nvSpPr>
-          <p:cNvPr id="12290" name="Footer Placeholder 3"/>
-          <p:cNvSpPr>
-            <a:spLocks noGrp="1"/>
-          </p:cNvSpPr>
-          <p:nvPr>
-            <p:ph type="ftr" sz="quarter" idx="10"/>
-          </p:nvPr>
-        </p:nvSpPr>
-        <p:spPr>
-          <a:noFill/>
-          <a:ln/>
-          <a:extLst>
-            <a:ext uri="{909E8E84-426E-40DD-AFC4-6F175D3DCCD1}">
-              <a14:hiddenFill xmlns:a14="http://schemas.microsoft.com/office/drawing/2010/main">
-                <a:solidFill>
-                  <a:srgbClr val="FFFFFF"/>
-                </a:solidFill>
-              </a14:hiddenFill>
-            </a:ext>
-            <a:ext uri="{91240B29-F687-4F45-9708-019B960494DF}">
-              <a14:hiddenLine xmlns:a14="http://schemas.microsoft.com/office/drawing/2010/main" w="9525">
-                <a:solidFill>
-                  <a:srgbClr val="000000"/>
-                </a:solidFill>
-                <a:miter lim="800000"/>
-                <a:headEnd/>
-                <a:tailEnd/>
-              </a14:hiddenLine>
-            </a:ext>
-          </a:extLst>
-        </p:spPr>
-        <p:txBody>
-          <a:bodyPr/>
-          <a:lstStyle>
-            <a:lvl1pPr eaLnBrk="0" hangingPunct="0">
-              <a:defRPr>
-                <a:solidFill>
-                  <a:schemeClr val="tx1"/>
-                </a:solidFill>
-                <a:latin typeface="Arial" charset="0"/>
-              </a:defRPr>
-            </a:lvl1pPr>
-            <a:lvl2pPr marL="742950" indent="-285750" eaLnBrk="0" hangingPunct="0">
-              <a:defRPr>
-                <a:solidFill>
-                  <a:schemeClr val="tx1"/>
-                </a:solidFill>
-                <a:latin typeface="Arial" charset="0"/>
-              </a:defRPr>
-            </a:lvl2pPr>
-            <a:lvl3pPr marL="1143000" indent="-228600" eaLnBrk="0" hangingPunct="0">
-              <a:defRPr>
-                <a:solidFill>
-                  <a:schemeClr val="tx1"/>
-                </a:solidFill>
-                <a:latin typeface="Arial" charset="0"/>
-              </a:defRPr>
-            </a:lvl3pPr>
-            <a:lvl4pPr marL="1600200" indent="-228600" eaLnBrk="0" hangingPunct="0">
-              <a:defRPr>
-                <a:solidFill>
-                  <a:schemeClr val="tx1"/>
-                </a:solidFill>
-                <a:latin typeface="Arial" charset="0"/>
-              </a:defRPr>
-            </a:lvl4pPr>
-            <a:lvl5pPr marL="2057400" indent="-228600" eaLnBrk="0" hangingPunct="0">
-              <a:defRPr>
-                <a:solidFill>
-                  <a:schemeClr val="tx1"/>
-                </a:solidFill>
-                <a:latin typeface="Arial" charset="0"/>
-              </a:defRPr>
-            </a:lvl5pPr>
-            <a:lvl6pPr marL="2514600" indent="-228600" eaLnBrk="0" fontAlgn="base" hangingPunct="0">
-              <a:spcBef>
-                <a:spcPct val="0"/>
-              </a:spcBef>
-              <a:spcAft>
-                <a:spcPct val="0"/>
-              </a:spcAft>
-              <a:defRPr>
-                <a:solidFill>
-                  <a:schemeClr val="tx1"/>
-                </a:solidFill>
-                <a:latin typeface="Arial" charset="0"/>
-              </a:defRPr>
-            </a:lvl6pPr>
-            <a:lvl7pPr marL="2971800" indent="-228600" eaLnBrk="0" fontAlgn="base" hangingPunct="0">
-              <a:spcBef>
-                <a:spcPct val="0"/>
-              </a:spcBef>
-              <a:spcAft>
-                <a:spcPct val="0"/>
-              </a:spcAft>
-              <a:defRPr>
-                <a:solidFill>
-                  <a:schemeClr val="tx1"/>
-                </a:solidFill>
-                <a:latin typeface="Arial" charset="0"/>
-              </a:defRPr>
-            </a:lvl7pPr>
-            <a:lvl8pPr marL="3429000" indent="-228600" eaLnBrk="0" fontAlgn="base" hangingPunct="0">
-              <a:spcBef>
-                <a:spcPct val="0"/>
-              </a:spcBef>
-              <a:spcAft>
-                <a:spcPct val="0"/>
-              </a:spcAft>
-              <a:defRPr>
-                <a:solidFill>
-                  <a:schemeClr val="tx1"/>
-                </a:solidFill>
-                <a:latin typeface="Arial" charset="0"/>
-              </a:defRPr>
-            </a:lvl8pPr>
-            <a:lvl9pPr marL="3886200" indent="-228600" eaLnBrk="0" fontAlgn="base" hangingPunct="0">
-              <a:spcBef>
-                <a:spcPct val="0"/>
-              </a:spcBef>
-              <a:spcAft>
-                <a:spcPct val="0"/>
-              </a:spcAft>
-              <a:defRPr>
-                <a:solidFill>
-                  <a:schemeClr val="tx1"/>
-                </a:solidFill>
-                <a:latin typeface="Arial" charset="0"/>
-              </a:defRPr>
-            </a:lvl9pPr>
-          </a:lstStyle>
-          <a:p>
-            <a:pPr eaLnBrk="1" hangingPunct="1"/>
-            <a:r>
-              <a:rPr lang="en-US" smtClean="0"/>
-              <a:t>Stock Concept</a:t>
-            </a:r>
-          </a:p>
-        </p:txBody>
-      </p:sp>
-      <p:sp>
-        <p:nvSpPr>
-          <p:cNvPr id="12291" name="Slide Number Placeholder 4"/>
-          <p:cNvSpPr>
-            <a:spLocks noGrp="1"/>
-          </p:cNvSpPr>
-          <p:nvPr>
-            <p:ph type="sldNum" sz="quarter" idx="11"/>
-          </p:nvPr>
-        </p:nvSpPr>
-        <p:spPr>
-          <a:noFill/>
-          <a:ln/>
-          <a:extLst>
-            <a:ext uri="{909E8E84-426E-40DD-AFC4-6F175D3DCCD1}">
-              <a14:hiddenFill xmlns:a14="http://schemas.microsoft.com/office/drawing/2010/main">
-                <a:solidFill>
-                  <a:srgbClr val="FFFFFF"/>
-                </a:solidFill>
-              </a14:hiddenFill>
-            </a:ext>
-            <a:ext uri="{91240B29-F687-4F45-9708-019B960494DF}">
-              <a14:hiddenLine xmlns:a14="http://schemas.microsoft.com/office/drawing/2010/main" w="9525">
-                <a:solidFill>
-                  <a:srgbClr val="000000"/>
-                </a:solidFill>
-                <a:miter lim="800000"/>
-                <a:headEnd/>
-                <a:tailEnd/>
-              </a14:hiddenLine>
-            </a:ext>
-          </a:extLst>
-        </p:spPr>
-        <p:txBody>
-          <a:bodyPr/>
-          <a:lstStyle>
-            <a:lvl1pPr eaLnBrk="0" hangingPunct="0">
-              <a:defRPr>
-                <a:solidFill>
-                  <a:schemeClr val="tx1"/>
-                </a:solidFill>
-                <a:latin typeface="Arial" charset="0"/>
-              </a:defRPr>
-            </a:lvl1pPr>
-            <a:lvl2pPr marL="742950" indent="-285750" eaLnBrk="0" hangingPunct="0">
-              <a:defRPr>
-                <a:solidFill>
-                  <a:schemeClr val="tx1"/>
-                </a:solidFill>
-                <a:latin typeface="Arial" charset="0"/>
-              </a:defRPr>
-            </a:lvl2pPr>
-            <a:lvl3pPr marL="1143000" indent="-228600" eaLnBrk="0" hangingPunct="0">
-              <a:defRPr>
-                <a:solidFill>
-                  <a:schemeClr val="tx1"/>
-                </a:solidFill>
-                <a:latin typeface="Arial" charset="0"/>
-              </a:defRPr>
-            </a:lvl3pPr>
-            <a:lvl4pPr marL="1600200" indent="-228600" eaLnBrk="0" hangingPunct="0">
-              <a:defRPr>
-                <a:solidFill>
-                  <a:schemeClr val="tx1"/>
-                </a:solidFill>
-                <a:latin typeface="Arial" charset="0"/>
-              </a:defRPr>
-            </a:lvl4pPr>
-            <a:lvl5pPr marL="2057400" indent="-228600" eaLnBrk="0" hangingPunct="0">
-              <a:defRPr>
-                <a:solidFill>
-                  <a:schemeClr val="tx1"/>
-                </a:solidFill>
-                <a:latin typeface="Arial" charset="0"/>
-              </a:defRPr>
-            </a:lvl5pPr>
-            <a:lvl6pPr marL="2514600" indent="-228600" eaLnBrk="0" fontAlgn="base" hangingPunct="0">
-              <a:spcBef>
-                <a:spcPct val="0"/>
-              </a:spcBef>
-              <a:spcAft>
-                <a:spcPct val="0"/>
-              </a:spcAft>
-              <a:defRPr>
-                <a:solidFill>
-                  <a:schemeClr val="tx1"/>
-                </a:solidFill>
-                <a:latin typeface="Arial" charset="0"/>
-              </a:defRPr>
-            </a:lvl6pPr>
-            <a:lvl7pPr marL="2971800" indent="-228600" eaLnBrk="0" fontAlgn="base" hangingPunct="0">
-              <a:spcBef>
-                <a:spcPct val="0"/>
-              </a:spcBef>
-              <a:spcAft>
-                <a:spcPct val="0"/>
-              </a:spcAft>
-              <a:defRPr>
-                <a:solidFill>
-                  <a:schemeClr val="tx1"/>
-                </a:solidFill>
-                <a:latin typeface="Arial" charset="0"/>
-              </a:defRPr>
-            </a:lvl7pPr>
-            <a:lvl8pPr marL="3429000" indent="-228600" eaLnBrk="0" fontAlgn="base" hangingPunct="0">
-              <a:spcBef>
-                <a:spcPct val="0"/>
-              </a:spcBef>
-              <a:spcAft>
-                <a:spcPct val="0"/>
-              </a:spcAft>
-              <a:defRPr>
-                <a:solidFill>
-                  <a:schemeClr val="tx1"/>
-                </a:solidFill>
-                <a:latin typeface="Arial" charset="0"/>
-              </a:defRPr>
-            </a:lvl8pPr>
-            <a:lvl9pPr marL="3886200" indent="-228600" eaLnBrk="0" fontAlgn="base" hangingPunct="0">
-              <a:spcBef>
-                <a:spcPct val="0"/>
-              </a:spcBef>
-              <a:spcAft>
-                <a:spcPct val="0"/>
-              </a:spcAft>
-              <a:defRPr>
-                <a:solidFill>
-                  <a:schemeClr val="tx1"/>
-                </a:solidFill>
-                <a:latin typeface="Arial" charset="0"/>
-              </a:defRPr>
-            </a:lvl9pPr>
-          </a:lstStyle>
-          <a:p>
-            <a:pPr eaLnBrk="1" hangingPunct="1"/>
-            <a:fld id="{49AE2D1C-40B6-42A8-AAE0-913D246340EF}" type="slidenum">
-              <a:rPr lang="en-US" smtClean="0"/>
-              <a:pPr eaLnBrk="1" hangingPunct="1"/>
-              <a:t>1</a:t>
-            </a:fld>
-            <a:endParaRPr lang="en-US" smtClean="0"/>
-          </a:p>
-        </p:txBody>
-      </p:sp>
-      <p:sp>
-        <p:nvSpPr>
-          <p:cNvPr id="12292" name="Rectangle 2"/>
-          <p:cNvSpPr>
-            <a:spLocks noGrp="1" noChangeArrowheads="1"/>
-          </p:cNvSpPr>
-          <p:nvPr>
-            <p:ph type="title"/>
-          </p:nvPr>
-        </p:nvSpPr>
-        <p:spPr/>
-        <p:txBody>
-          <a:bodyPr/>
-          <a:lstStyle/>
-          <a:p>
-            <a:pPr eaLnBrk="1" hangingPunct="1"/>
-            <a:r>
-              <a:rPr lang="en-US" dirty="0" smtClean="0"/>
-              <a:t>Stock</a:t>
-            </a:r>
-            <a:endParaRPr lang="en-US" dirty="0" smtClean="0"/>
-          </a:p>
-        </p:txBody>
-      </p:sp>
-      <p:sp>
-        <p:nvSpPr>
-          <p:cNvPr id="12293" name="Rectangle 3"/>
-          <p:cNvSpPr>
-            <a:spLocks noGrp="1" noChangeArrowheads="1"/>
-          </p:cNvSpPr>
-          <p:nvPr>
-            <p:ph type="body" idx="1"/>
-          </p:nvPr>
-        </p:nvSpPr>
-        <p:spPr>
-          <a:xfrm>
-            <a:off x="0" y="914400"/>
-            <a:ext cx="9144000" cy="5562600"/>
-          </a:xfrm>
-        </p:spPr>
-        <p:txBody>
-          <a:bodyPr/>
-          <a:lstStyle/>
-          <a:p>
-            <a:pPr eaLnBrk="1" hangingPunct="1"/>
-            <a:r>
-              <a:rPr lang="en-US" sz="3000" dirty="0" smtClean="0"/>
-              <a:t>A </a:t>
-            </a:r>
-            <a:r>
-              <a:rPr lang="en-US" sz="3000" dirty="0" smtClean="0"/>
-              <a:t>group of individuals of the same </a:t>
-            </a:r>
-            <a:r>
-              <a:rPr lang="en-US" sz="3000" dirty="0" smtClean="0"/>
-              <a:t>species where </a:t>
-            </a:r>
-            <a:r>
-              <a:rPr lang="en-US" sz="3000" dirty="0" smtClean="0"/>
-              <a:t>immigration and </a:t>
-            </a:r>
-            <a:r>
-              <a:rPr lang="en-US" sz="3000" dirty="0" smtClean="0"/>
-              <a:t>emigration are </a:t>
-            </a:r>
-            <a:r>
-              <a:rPr lang="en-US" sz="3000" dirty="0" smtClean="0"/>
-              <a:t>negligible in relation to </a:t>
-            </a:r>
-            <a:r>
-              <a:rPr lang="en-US" sz="3000" dirty="0" smtClean="0"/>
-              <a:t>growth </a:t>
-            </a:r>
-            <a:r>
-              <a:rPr lang="en-US" sz="3000" dirty="0" smtClean="0"/>
-              <a:t>and mortality. A </a:t>
-            </a:r>
-            <a:r>
-              <a:rPr lang="en-US" sz="3000" dirty="0" smtClean="0"/>
-              <a:t>stock </a:t>
-            </a:r>
-            <a:r>
-              <a:rPr lang="en-US" sz="3000" dirty="0" smtClean="0"/>
-              <a:t>is </a:t>
-            </a:r>
-            <a:r>
-              <a:rPr lang="en-US" sz="3000" dirty="0" smtClean="0"/>
-              <a:t>a </a:t>
-            </a:r>
-            <a:r>
-              <a:rPr lang="en-US" sz="3000" dirty="0" smtClean="0"/>
-              <a:t>self-contained population with its own spawning area. </a:t>
-            </a:r>
-            <a:r>
-              <a:rPr lang="en-US" sz="3000" dirty="0" smtClean="0"/>
-              <a:t>Fishing </a:t>
-            </a:r>
-            <a:r>
-              <a:rPr lang="en-US" sz="3000" dirty="0" smtClean="0"/>
-              <a:t>upon one </a:t>
-            </a:r>
-            <a:r>
-              <a:rPr lang="en-US" sz="3000" dirty="0" smtClean="0"/>
-              <a:t>stock </a:t>
-            </a:r>
-            <a:r>
-              <a:rPr lang="en-US" sz="3000" dirty="0" smtClean="0"/>
-              <a:t>has no effect upon </a:t>
-            </a:r>
-            <a:r>
-              <a:rPr lang="en-US" sz="3000" dirty="0" smtClean="0"/>
-              <a:t>other </a:t>
-            </a:r>
-            <a:r>
-              <a:rPr lang="en-US" sz="3000" dirty="0" smtClean="0"/>
-              <a:t>stocks.” </a:t>
-            </a:r>
-            <a:r>
-              <a:rPr lang="en-US" sz="3000" i="1" dirty="0" smtClean="0"/>
-              <a:t>–</a:t>
-            </a:r>
-            <a:r>
-              <a:rPr lang="en-US" sz="3000" dirty="0" smtClean="0"/>
-              <a:t> </a:t>
-            </a:r>
-            <a:r>
-              <a:rPr lang="en-US" sz="2000" dirty="0" smtClean="0"/>
-              <a:t>paraphrased from</a:t>
-            </a:r>
-            <a:r>
-              <a:rPr lang="en-US" sz="2000" i="1" dirty="0" smtClean="0"/>
-              <a:t> </a:t>
-            </a:r>
-            <a:r>
-              <a:rPr lang="en-US" sz="2000" i="1" dirty="0" smtClean="0">
-                <a:hlinkClick r:id="rId3"/>
-              </a:rPr>
-              <a:t>Holden and </a:t>
-            </a:r>
-            <a:r>
-              <a:rPr lang="en-US" sz="2000" i="1" dirty="0" err="1" smtClean="0">
-                <a:hlinkClick r:id="rId3"/>
-              </a:rPr>
-              <a:t>Raitt</a:t>
-            </a:r>
-            <a:r>
-              <a:rPr lang="en-US" sz="2000" i="1" dirty="0" smtClean="0">
-                <a:hlinkClick r:id="rId3"/>
-              </a:rPr>
-              <a:t>, </a:t>
-            </a:r>
-            <a:r>
-              <a:rPr lang="en-US" sz="2000" i="1" dirty="0" smtClean="0">
-                <a:hlinkClick r:id="rId3"/>
-              </a:rPr>
-              <a:t>1974</a:t>
-            </a:r>
-            <a:endParaRPr lang="en-US" sz="2000" i="1" dirty="0" smtClean="0"/>
-          </a:p>
-          <a:p>
-            <a:pPr eaLnBrk="1" hangingPunct="1"/>
-            <a:endParaRPr lang="en-US" sz="1800" i="1" dirty="0" smtClean="0"/>
-          </a:p>
-          <a:p>
-            <a:pPr eaLnBrk="1" hangingPunct="1"/>
-            <a:r>
-              <a:rPr lang="en-US" sz="3000" dirty="0" smtClean="0"/>
-              <a:t>Subpopulations </a:t>
-            </a:r>
-            <a:r>
-              <a:rPr lang="en-US" sz="3000" dirty="0"/>
-              <a:t>of a species for which intrinsic factors (growth, recruitment, mortality) are </a:t>
-            </a:r>
-            <a:r>
-              <a:rPr lang="en-US" sz="3000" dirty="0" smtClean="0"/>
-              <a:t>significant </a:t>
-            </a:r>
-            <a:r>
-              <a:rPr lang="en-US" sz="3000" dirty="0"/>
-              <a:t>factors determining the stock's </a:t>
-            </a:r>
-            <a:r>
-              <a:rPr lang="en-US" sz="3000" dirty="0" smtClean="0"/>
-              <a:t>dynamics</a:t>
-            </a:r>
-            <a:r>
-              <a:rPr lang="en-US" sz="3000" dirty="0"/>
-              <a:t>, while extrinsic factors (immigration and emigration) are traditionally ignored.” </a:t>
-            </a:r>
-            <a:r>
-              <a:rPr lang="en-US" sz="3000" i="1" dirty="0"/>
-              <a:t>– </a:t>
-            </a:r>
-            <a:r>
-              <a:rPr lang="en-US" sz="2000" dirty="0"/>
-              <a:t>paraphrased from</a:t>
-            </a:r>
-            <a:r>
-              <a:rPr lang="en-US" sz="2000" i="1" dirty="0"/>
-              <a:t> </a:t>
-            </a:r>
-            <a:r>
-              <a:rPr lang="en-US" sz="2000" i="1" dirty="0">
-                <a:hlinkClick r:id="rId4"/>
-              </a:rPr>
-              <a:t>Wikipedia</a:t>
-            </a:r>
-            <a:endParaRPr lang="en-US" sz="2000" i="1" dirty="0"/>
-          </a:p>
-          <a:p>
-            <a:pPr eaLnBrk="1" hangingPunct="1"/>
-            <a:endParaRPr lang="en-US" sz="2800" i="1" dirty="0" smtClean="0"/>
-          </a:p>
-        </p:txBody>
-      </p:sp>
-    </p:spTree>
-    <p:extLst>
-      <p:ext uri="{BB962C8B-B14F-4D97-AF65-F5344CB8AC3E}">
-        <p14:creationId xmlns:p14="http://schemas.microsoft.com/office/powerpoint/2010/main" val="2658180733"/>
-      </p:ext>
-    </p:extLst>
-  </p:cSld>
-  <p:clrMapOvr>
-    <a:masterClrMapping/>
-  </p:clrMapOvr>
-  <p:transition/>
-  <p:timing>
-    <p:tnLst>
-      <p:par>
-        <p:cTn id="1" dur="indefinite" restart="never" nodeType="tmRoot">
-          <p:childTnLst>
-            <p:seq concurrent="1" nextAc="seek">
-              <p:cTn id="2" dur="indefinite" nodeType="mainSeq">
-                <p:childTnLst>
-                  <p:par>
-                    <p:cTn id="3" fill="hold">
-                      <p:stCondLst>
-                        <p:cond delay="indefinite"/>
-                      </p:stCondLst>
-                      <p:childTnLst>
-                        <p:par>
-                          <p:cTn id="4" fill="hold">
-                            <p:stCondLst>
-                              <p:cond delay="0"/>
-                            </p:stCondLst>
-                            <p:childTnLst>
-                              <p:par>
-                                <p:cTn id="5" presetID="1" presetClass="entr" presetSubtype="0" fill="hold" grpId="0" nodeType="clickEffect">
-                                  <p:stCondLst>
-                                    <p:cond delay="0"/>
-                                  </p:stCondLst>
-                                  <p:childTnLst>
-                                    <p:set>
-                                      <p:cBhvr>
-                                        <p:cTn id="6" dur="1" fill="hold">
-                                          <p:stCondLst>
-                                            <p:cond delay="0"/>
-                                          </p:stCondLst>
-                                        </p:cTn>
-                                        <p:tgtEl>
-                                          <p:spTgt spid="12293">
-                                            <p:txEl>
-                                              <p:pRg st="2" end="2"/>
-                                            </p:txEl>
-                                          </p:spTgt>
-                                        </p:tgtEl>
-                                        <p:attrNameLst>
-                                          <p:attrName>style.visibility</p:attrName>
-                                        </p:attrNameLst>
-                                      </p:cBhvr>
-                                      <p:to>
-                                        <p:strVal val="visible"/>
-                                      </p:to>
-                                    </p:set>
-                                  </p:childTnLst>
-                                </p:cTn>
-                              </p:par>
-                            </p:childTnLst>
-                          </p:cTn>
-                        </p:par>
-                      </p:childTnLst>
-                    </p:cTn>
-                  </p:par>
-                </p:childTnLst>
-              </p:cTn>
-              <p:prevCondLst>
-                <p:cond evt="onPrev" delay="0">
-                  <p:tgtEl>
-                    <p:sldTgt/>
-                  </p:tgtEl>
-                </p:cond>
-              </p:prevCondLst>
-              <p:nextCondLst>
-                <p:cond evt="onNext" delay="0">
-                  <p:tgtEl>
-                    <p:sldTgt/>
-                  </p:tgtEl>
-                </p:cond>
-              </p:nextCondLst>
-            </p:seq>
-          </p:childTnLst>
-        </p:cTn>
-      </p:par>
-    </p:tnLst>
-    <p:bldLst>
-      <p:bldP spid="12293" grpId="0" uiExpand="1" build="p"/>
-    </p:bldLst>
-  </p:timing>
-</p:sld>
-</file>
-
-<file path=ppt/slides/slide2.xml><?xml version="1.0" encoding="utf-8"?>
-<p:sld xmlns:a="http://schemas.openxmlformats.org/drawingml/2006/main" xmlns:r="http://schemas.openxmlformats.org/officeDocument/2006/relationships" xmlns:p="http://schemas.openxmlformats.org/presentationml/2006/main">
-  <p:cSld>
-    <p:spTree>
-      <p:nvGrpSpPr>
-        <p:cNvPr id="1" name=""/>
-        <p:cNvGrpSpPr/>
-        <p:nvPr/>
-      </p:nvGrpSpPr>
-      <p:grpSpPr>
-        <a:xfrm>
-          <a:off x="0" y="0"/>
-          <a:ext cx="0" cy="0"/>
-          <a:chOff x="0" y="0"/>
-          <a:chExt cx="0" cy="0"/>
-        </a:xfrm>
-      </p:grpSpPr>
-      <p:sp>
-        <p:nvSpPr>
           <p:cNvPr id="2" name="Title 1"/>
           <p:cNvSpPr>
             <a:spLocks noGrp="1"/>
@@ -4685,35 +3824,9 @@
           <a:p>
             <a:r>
               <a:rPr lang="en-US" dirty="0" smtClean="0"/>
-              <a:t>Conceptual Model of a Stock</a:t>
+              <a:t>Environments of a Stock</a:t>
             </a:r>
             <a:endParaRPr lang="en-US" dirty="0"/>
-          </a:p>
-        </p:txBody>
-      </p:sp>
-      <p:sp>
-        <p:nvSpPr>
-          <p:cNvPr id="4" name="Footer Placeholder 3"/>
-          <p:cNvSpPr>
-            <a:spLocks noGrp="1"/>
-          </p:cNvSpPr>
-          <p:nvPr>
-            <p:ph type="ftr" sz="quarter" idx="10"/>
-          </p:nvPr>
-        </p:nvSpPr>
-        <p:spPr/>
-        <p:txBody>
-          <a:bodyPr/>
-          <a:lstStyle/>
-          <a:p>
-            <a:pPr>
-              <a:defRPr/>
-            </a:pPr>
-            <a:r>
-              <a:rPr lang="en-US" smtClean="0"/>
-              <a:t>Stock Concept</a:t>
-            </a:r>
-            <a:endParaRPr lang="en-US"/>
           </a:p>
         </p:txBody>
       </p:sp>
@@ -4740,1441 +3853,7 @@
               <a:pPr>
                 <a:defRPr/>
               </a:pPr>
-              <a:t>2</a:t>
-            </a:fld>
-            <a:endParaRPr lang="en-US"/>
-          </a:p>
-        </p:txBody>
-      </p:sp>
-      <p:sp>
-        <p:nvSpPr>
-          <p:cNvPr id="10" name="Rounded Rectangle 9"/>
-          <p:cNvSpPr/>
-          <p:nvPr/>
-        </p:nvSpPr>
-        <p:spPr>
-          <a:xfrm>
-            <a:off x="952500" y="1758232"/>
-            <a:ext cx="7239000" cy="4191000"/>
-          </a:xfrm>
-          <a:prstGeom prst="roundRect">
-            <a:avLst/>
-          </a:prstGeom>
-          <a:solidFill>
-            <a:srgbClr val="C5DCFF"/>
-          </a:solidFill>
-          <a:ln>
-            <a:solidFill>
-              <a:schemeClr val="tx1"/>
-            </a:solidFill>
-          </a:ln>
-        </p:spPr>
-        <p:style>
-          <a:lnRef idx="2">
-            <a:schemeClr val="accent1">
-              <a:shade val="50000"/>
-            </a:schemeClr>
-          </a:lnRef>
-          <a:fillRef idx="1">
-            <a:schemeClr val="accent1"/>
-          </a:fillRef>
-          <a:effectRef idx="0">
-            <a:schemeClr val="accent1"/>
-          </a:effectRef>
-          <a:fontRef idx="minor">
-            <a:schemeClr val="lt1"/>
-          </a:fontRef>
-        </p:style>
-        <p:txBody>
-          <a:bodyPr rtlCol="0" anchor="ctr"/>
-          <a:lstStyle/>
-          <a:p>
-            <a:pPr algn="ctr"/>
-            <a:endParaRPr lang="en-US" b="1" dirty="0"/>
-          </a:p>
-        </p:txBody>
-      </p:sp>
-      <p:sp>
-        <p:nvSpPr>
-          <p:cNvPr id="15" name="Rectangle 14"/>
-          <p:cNvSpPr/>
-          <p:nvPr/>
-        </p:nvSpPr>
-        <p:spPr>
-          <a:xfrm>
-            <a:off x="3667539" y="3352800"/>
-            <a:ext cx="1828800" cy="914400"/>
-          </a:xfrm>
-          <a:prstGeom prst="rect">
-            <a:avLst/>
-          </a:prstGeom>
-        </p:spPr>
-        <p:style>
-          <a:lnRef idx="2">
-            <a:schemeClr val="accent1">
-              <a:shade val="50000"/>
-            </a:schemeClr>
-          </a:lnRef>
-          <a:fillRef idx="1">
-            <a:schemeClr val="accent1"/>
-          </a:fillRef>
-          <a:effectRef idx="0">
-            <a:schemeClr val="accent1"/>
-          </a:effectRef>
-          <a:fontRef idx="minor">
-            <a:schemeClr val="lt1"/>
-          </a:fontRef>
-        </p:style>
-        <p:txBody>
-          <a:bodyPr rtlCol="0" anchor="ctr"/>
-          <a:lstStyle/>
-          <a:p>
-            <a:pPr algn="ctr"/>
-            <a:r>
-              <a:rPr lang="en-US" sz="2400" b="1" dirty="0" smtClean="0">
-                <a:solidFill>
-                  <a:schemeClr val="accent6"/>
-                </a:solidFill>
-              </a:rPr>
-              <a:t>Population</a:t>
-            </a:r>
-          </a:p>
-          <a:p>
-            <a:pPr algn="ctr"/>
-            <a:r>
-              <a:rPr lang="en-US" sz="2400" b="1" dirty="0" smtClean="0">
-                <a:solidFill>
-                  <a:schemeClr val="accent6"/>
-                </a:solidFill>
-              </a:rPr>
-              <a:t>Numbers</a:t>
-            </a:r>
-            <a:endParaRPr lang="en-US" sz="2400" b="1" dirty="0">
-              <a:solidFill>
-                <a:schemeClr val="accent6"/>
-              </a:solidFill>
-            </a:endParaRPr>
-          </a:p>
-        </p:txBody>
-      </p:sp>
-      <p:cxnSp>
-        <p:nvCxnSpPr>
-          <p:cNvPr id="17" name="Straight Arrow Connector 16"/>
-          <p:cNvCxnSpPr>
-            <a:stCxn id="23" idx="3"/>
-          </p:cNvCxnSpPr>
-          <p:nvPr/>
-        </p:nvCxnSpPr>
-        <p:spPr>
-          <a:xfrm>
-            <a:off x="3139440" y="2987040"/>
-            <a:ext cx="528099" cy="634116"/>
-          </a:xfrm>
-          <a:prstGeom prst="straightConnector1">
-            <a:avLst/>
-          </a:prstGeom>
-          <a:ln w="50800" cap="flat">
-            <a:solidFill>
-              <a:srgbClr val="FF0000"/>
-            </a:solidFill>
-            <a:round/>
-            <a:tailEnd type="stealth" w="lg" len="lg"/>
-          </a:ln>
-        </p:spPr>
-        <p:style>
-          <a:lnRef idx="1">
-            <a:schemeClr val="accent1"/>
-          </a:lnRef>
-          <a:fillRef idx="0">
-            <a:schemeClr val="accent1"/>
-          </a:fillRef>
-          <a:effectRef idx="0">
-            <a:schemeClr val="accent1"/>
-          </a:effectRef>
-          <a:fontRef idx="minor">
-            <a:schemeClr val="tx1"/>
-          </a:fontRef>
-        </p:style>
-      </p:cxnSp>
-      <p:cxnSp>
-        <p:nvCxnSpPr>
-          <p:cNvPr id="20" name="Straight Arrow Connector 19"/>
-          <p:cNvCxnSpPr/>
-          <p:nvPr/>
-        </p:nvCxnSpPr>
-        <p:spPr>
-          <a:xfrm flipV="1">
-            <a:off x="3149379" y="4078356"/>
-            <a:ext cx="518160" cy="554604"/>
-          </a:xfrm>
-          <a:prstGeom prst="straightConnector1">
-            <a:avLst/>
-          </a:prstGeom>
-          <a:ln w="50800" cap="flat">
-            <a:solidFill>
-              <a:srgbClr val="FF0000"/>
-            </a:solidFill>
-            <a:round/>
-            <a:tailEnd type="stealth" w="lg" len="lg"/>
-          </a:ln>
-        </p:spPr>
-        <p:style>
-          <a:lnRef idx="1">
-            <a:schemeClr val="accent1"/>
-          </a:lnRef>
-          <a:fillRef idx="0">
-            <a:schemeClr val="accent1"/>
-          </a:fillRef>
-          <a:effectRef idx="0">
-            <a:schemeClr val="accent1"/>
-          </a:effectRef>
-          <a:fontRef idx="minor">
-            <a:schemeClr val="tx1"/>
-          </a:fontRef>
-        </p:style>
-      </p:cxnSp>
-      <p:sp>
-        <p:nvSpPr>
-          <p:cNvPr id="23" name="Rectangle 22"/>
-          <p:cNvSpPr/>
-          <p:nvPr/>
-        </p:nvSpPr>
-        <p:spPr>
-          <a:xfrm>
-            <a:off x="1447800" y="2667000"/>
-            <a:ext cx="1691640" cy="640080"/>
-          </a:xfrm>
-          <a:prstGeom prst="rect">
-            <a:avLst/>
-          </a:prstGeom>
-          <a:solidFill>
-            <a:srgbClr val="FFB8A7"/>
-          </a:solidFill>
-          <a:ln>
-            <a:solidFill>
-              <a:srgbClr val="FF0000"/>
-            </a:solidFill>
-          </a:ln>
-        </p:spPr>
-        <p:style>
-          <a:lnRef idx="2">
-            <a:schemeClr val="accent1">
-              <a:shade val="50000"/>
-            </a:schemeClr>
-          </a:lnRef>
-          <a:fillRef idx="1">
-            <a:schemeClr val="accent1"/>
-          </a:fillRef>
-          <a:effectRef idx="0">
-            <a:schemeClr val="accent1"/>
-          </a:effectRef>
-          <a:fontRef idx="minor">
-            <a:schemeClr val="lt1"/>
-          </a:fontRef>
-        </p:style>
-        <p:txBody>
-          <a:bodyPr rtlCol="0" anchor="ctr"/>
-          <a:lstStyle/>
-          <a:p>
-            <a:pPr algn="ctr"/>
-            <a:r>
-              <a:rPr lang="en-US" sz="2000" b="1" dirty="0" smtClean="0">
-                <a:solidFill>
-                  <a:srgbClr val="FF0000"/>
-                </a:solidFill>
-              </a:rPr>
-              <a:t>Recruitment</a:t>
-            </a:r>
-            <a:endParaRPr lang="en-US" b="1" dirty="0">
-              <a:solidFill>
-                <a:srgbClr val="FF0000"/>
-              </a:solidFill>
-            </a:endParaRPr>
-          </a:p>
-        </p:txBody>
-      </p:sp>
-      <p:sp>
-        <p:nvSpPr>
-          <p:cNvPr id="25" name="Rectangle 24"/>
-          <p:cNvSpPr/>
-          <p:nvPr/>
-        </p:nvSpPr>
-        <p:spPr>
-          <a:xfrm>
-            <a:off x="1457739" y="4312920"/>
-            <a:ext cx="1691640" cy="640080"/>
-          </a:xfrm>
-          <a:prstGeom prst="rect">
-            <a:avLst/>
-          </a:prstGeom>
-          <a:solidFill>
-            <a:srgbClr val="FFB8A7"/>
-          </a:solidFill>
-          <a:ln>
-            <a:solidFill>
-              <a:srgbClr val="FF0000"/>
-            </a:solidFill>
-            <a:prstDash val="dash"/>
-          </a:ln>
-        </p:spPr>
-        <p:style>
-          <a:lnRef idx="2">
-            <a:schemeClr val="accent1">
-              <a:shade val="50000"/>
-            </a:schemeClr>
-          </a:lnRef>
-          <a:fillRef idx="1">
-            <a:schemeClr val="accent1"/>
-          </a:fillRef>
-          <a:effectRef idx="0">
-            <a:schemeClr val="accent1"/>
-          </a:effectRef>
-          <a:fontRef idx="minor">
-            <a:schemeClr val="lt1"/>
-          </a:fontRef>
-        </p:style>
-        <p:txBody>
-          <a:bodyPr rtlCol="0" anchor="ctr"/>
-          <a:lstStyle/>
-          <a:p>
-            <a:pPr algn="ctr"/>
-            <a:r>
-              <a:rPr lang="en-US" sz="2000" dirty="0" smtClean="0">
-                <a:solidFill>
-                  <a:srgbClr val="FF0000"/>
-                </a:solidFill>
-              </a:rPr>
-              <a:t>Immigration</a:t>
-            </a:r>
-            <a:endParaRPr lang="en-US" dirty="0">
-              <a:solidFill>
-                <a:srgbClr val="FF0000"/>
-              </a:solidFill>
-            </a:endParaRPr>
-          </a:p>
-        </p:txBody>
-      </p:sp>
-      <p:cxnSp>
-        <p:nvCxnSpPr>
-          <p:cNvPr id="28" name="Straight Arrow Connector 27"/>
-          <p:cNvCxnSpPr>
-            <a:endCxn id="31" idx="1"/>
-          </p:cNvCxnSpPr>
-          <p:nvPr/>
-        </p:nvCxnSpPr>
-        <p:spPr>
-          <a:xfrm flipV="1">
-            <a:off x="5506278" y="2987040"/>
-            <a:ext cx="692427" cy="634116"/>
-          </a:xfrm>
-          <a:prstGeom prst="straightConnector1">
-            <a:avLst/>
-          </a:prstGeom>
-          <a:ln w="50800" cap="flat">
-            <a:solidFill>
-              <a:schemeClr val="tx1">
-                <a:lumMod val="75000"/>
-                <a:lumOff val="25000"/>
-              </a:schemeClr>
-            </a:solidFill>
-            <a:round/>
-            <a:tailEnd type="stealth" w="lg" len="lg"/>
-          </a:ln>
-        </p:spPr>
-        <p:style>
-          <a:lnRef idx="1">
-            <a:schemeClr val="accent1"/>
-          </a:lnRef>
-          <a:fillRef idx="0">
-            <a:schemeClr val="accent1"/>
-          </a:fillRef>
-          <a:effectRef idx="0">
-            <a:schemeClr val="accent1"/>
-          </a:effectRef>
-          <a:fontRef idx="minor">
-            <a:schemeClr val="tx1"/>
-          </a:fontRef>
-        </p:style>
-      </p:cxnSp>
-      <p:cxnSp>
-        <p:nvCxnSpPr>
-          <p:cNvPr id="29" name="Straight Arrow Connector 28"/>
-          <p:cNvCxnSpPr>
-            <a:endCxn id="32" idx="1"/>
-          </p:cNvCxnSpPr>
-          <p:nvPr/>
-        </p:nvCxnSpPr>
-        <p:spPr>
-          <a:xfrm>
-            <a:off x="5506278" y="3810000"/>
-            <a:ext cx="675861" cy="15240"/>
-          </a:xfrm>
-          <a:prstGeom prst="straightConnector1">
-            <a:avLst/>
-          </a:prstGeom>
-          <a:ln w="50800" cap="flat">
-            <a:solidFill>
-              <a:schemeClr val="tx1">
-                <a:lumMod val="75000"/>
-                <a:lumOff val="25000"/>
-              </a:schemeClr>
-            </a:solidFill>
-            <a:round/>
-            <a:tailEnd type="stealth" w="lg" len="lg"/>
-          </a:ln>
-        </p:spPr>
-        <p:style>
-          <a:lnRef idx="1">
-            <a:schemeClr val="accent1"/>
-          </a:lnRef>
-          <a:fillRef idx="0">
-            <a:schemeClr val="accent1"/>
-          </a:fillRef>
-          <a:effectRef idx="0">
-            <a:schemeClr val="accent1"/>
-          </a:effectRef>
-          <a:fontRef idx="minor">
-            <a:schemeClr val="tx1"/>
-          </a:fontRef>
-        </p:style>
-      </p:cxnSp>
-      <p:cxnSp>
-        <p:nvCxnSpPr>
-          <p:cNvPr id="30" name="Straight Arrow Connector 29"/>
-          <p:cNvCxnSpPr>
-            <a:endCxn id="33" idx="1"/>
-          </p:cNvCxnSpPr>
-          <p:nvPr/>
-        </p:nvCxnSpPr>
-        <p:spPr>
-          <a:xfrm>
-            <a:off x="5506278" y="4095054"/>
-            <a:ext cx="702366" cy="537906"/>
-          </a:xfrm>
-          <a:prstGeom prst="straightConnector1">
-            <a:avLst/>
-          </a:prstGeom>
-          <a:ln w="50800" cap="flat">
-            <a:solidFill>
-              <a:schemeClr val="tx1">
-                <a:lumMod val="75000"/>
-                <a:lumOff val="25000"/>
-              </a:schemeClr>
-            </a:solidFill>
-            <a:round/>
-            <a:tailEnd type="stealth" w="lg" len="lg"/>
-          </a:ln>
-        </p:spPr>
-        <p:style>
-          <a:lnRef idx="1">
-            <a:schemeClr val="accent1"/>
-          </a:lnRef>
-          <a:fillRef idx="0">
-            <a:schemeClr val="accent1"/>
-          </a:fillRef>
-          <a:effectRef idx="0">
-            <a:schemeClr val="accent1"/>
-          </a:effectRef>
-          <a:fontRef idx="minor">
-            <a:schemeClr val="tx1"/>
-          </a:fontRef>
-        </p:style>
-      </p:cxnSp>
-      <p:sp>
-        <p:nvSpPr>
-          <p:cNvPr id="31" name="Rectangle 30"/>
-          <p:cNvSpPr/>
-          <p:nvPr/>
-        </p:nvSpPr>
-        <p:spPr>
-          <a:xfrm>
-            <a:off x="6198705" y="2667000"/>
-            <a:ext cx="1691640" cy="640080"/>
-          </a:xfrm>
-          <a:prstGeom prst="rect">
-            <a:avLst/>
-          </a:prstGeom>
-          <a:solidFill>
-            <a:schemeClr val="bg2">
-              <a:lumMod val="40000"/>
-              <a:lumOff val="60000"/>
-            </a:schemeClr>
-          </a:solidFill>
-          <a:ln>
-            <a:solidFill>
-              <a:schemeClr val="tx1"/>
-            </a:solidFill>
-          </a:ln>
-        </p:spPr>
-        <p:style>
-          <a:lnRef idx="2">
-            <a:schemeClr val="accent1">
-              <a:shade val="50000"/>
-            </a:schemeClr>
-          </a:lnRef>
-          <a:fillRef idx="1">
-            <a:schemeClr val="accent1"/>
-          </a:fillRef>
-          <a:effectRef idx="0">
-            <a:schemeClr val="accent1"/>
-          </a:effectRef>
-          <a:fontRef idx="minor">
-            <a:schemeClr val="lt1"/>
-          </a:fontRef>
-        </p:style>
-        <p:txBody>
-          <a:bodyPr rtlCol="0" anchor="ctr"/>
-          <a:lstStyle/>
-          <a:p>
-            <a:pPr algn="ctr"/>
-            <a:r>
-              <a:rPr lang="en-US" sz="2000" b="1" dirty="0" smtClean="0">
-                <a:solidFill>
-                  <a:schemeClr val="tx1"/>
-                </a:solidFill>
-              </a:rPr>
-              <a:t>Natural Mortality</a:t>
-            </a:r>
-            <a:endParaRPr lang="en-US" b="1" dirty="0">
-              <a:solidFill>
-                <a:schemeClr val="tx1"/>
-              </a:solidFill>
-            </a:endParaRPr>
-          </a:p>
-        </p:txBody>
-      </p:sp>
-      <p:sp>
-        <p:nvSpPr>
-          <p:cNvPr id="32" name="Rectangle 31"/>
-          <p:cNvSpPr/>
-          <p:nvPr/>
-        </p:nvSpPr>
-        <p:spPr>
-          <a:xfrm>
-            <a:off x="6182139" y="3505200"/>
-            <a:ext cx="1691640" cy="640080"/>
-          </a:xfrm>
-          <a:prstGeom prst="rect">
-            <a:avLst/>
-          </a:prstGeom>
-          <a:solidFill>
-            <a:schemeClr val="bg2">
-              <a:lumMod val="40000"/>
-              <a:lumOff val="60000"/>
-            </a:schemeClr>
-          </a:solidFill>
-          <a:ln>
-            <a:solidFill>
-              <a:schemeClr val="tx1"/>
-            </a:solidFill>
-          </a:ln>
-        </p:spPr>
-        <p:style>
-          <a:lnRef idx="2">
-            <a:schemeClr val="accent1">
-              <a:shade val="50000"/>
-            </a:schemeClr>
-          </a:lnRef>
-          <a:fillRef idx="1">
-            <a:schemeClr val="accent1"/>
-          </a:fillRef>
-          <a:effectRef idx="0">
-            <a:schemeClr val="accent1"/>
-          </a:effectRef>
-          <a:fontRef idx="minor">
-            <a:schemeClr val="lt1"/>
-          </a:fontRef>
-        </p:style>
-        <p:txBody>
-          <a:bodyPr rtlCol="0" anchor="ctr"/>
-          <a:lstStyle/>
-          <a:p>
-            <a:pPr algn="ctr"/>
-            <a:r>
-              <a:rPr lang="en-US" sz="2000" b="1" dirty="0" smtClean="0">
-                <a:solidFill>
-                  <a:schemeClr val="tx1"/>
-                </a:solidFill>
-              </a:rPr>
-              <a:t>Fishing Mortality</a:t>
-            </a:r>
-            <a:endParaRPr lang="en-US" sz="2000" b="1" dirty="0">
-              <a:solidFill>
-                <a:schemeClr val="tx1"/>
-              </a:solidFill>
-            </a:endParaRPr>
-          </a:p>
-        </p:txBody>
-      </p:sp>
-      <p:sp>
-        <p:nvSpPr>
-          <p:cNvPr id="33" name="Rectangle 32"/>
-          <p:cNvSpPr/>
-          <p:nvPr/>
-        </p:nvSpPr>
-        <p:spPr>
-          <a:xfrm>
-            <a:off x="6208644" y="4312920"/>
-            <a:ext cx="1691640" cy="640080"/>
-          </a:xfrm>
-          <a:prstGeom prst="rect">
-            <a:avLst/>
-          </a:prstGeom>
-          <a:solidFill>
-            <a:schemeClr val="bg2">
-              <a:lumMod val="40000"/>
-              <a:lumOff val="60000"/>
-            </a:schemeClr>
-          </a:solidFill>
-          <a:ln>
-            <a:solidFill>
-              <a:schemeClr val="tx1"/>
-            </a:solidFill>
-            <a:prstDash val="dash"/>
-          </a:ln>
-        </p:spPr>
-        <p:style>
-          <a:lnRef idx="2">
-            <a:schemeClr val="accent1">
-              <a:shade val="50000"/>
-            </a:schemeClr>
-          </a:lnRef>
-          <a:fillRef idx="1">
-            <a:schemeClr val="accent1"/>
-          </a:fillRef>
-          <a:effectRef idx="0">
-            <a:schemeClr val="accent1"/>
-          </a:effectRef>
-          <a:fontRef idx="minor">
-            <a:schemeClr val="lt1"/>
-          </a:fontRef>
-        </p:style>
-        <p:txBody>
-          <a:bodyPr rtlCol="0" anchor="ctr"/>
-          <a:lstStyle/>
-          <a:p>
-            <a:pPr algn="ctr"/>
-            <a:r>
-              <a:rPr lang="en-US" sz="2000" dirty="0" smtClean="0">
-                <a:solidFill>
-                  <a:schemeClr val="tx1"/>
-                </a:solidFill>
-              </a:rPr>
-              <a:t>Emigration</a:t>
-            </a:r>
-            <a:endParaRPr lang="en-US" dirty="0">
-              <a:solidFill>
-                <a:schemeClr val="tx1"/>
-              </a:solidFill>
-            </a:endParaRPr>
-          </a:p>
-        </p:txBody>
-      </p:sp>
-      <p:sp>
-        <p:nvSpPr>
-          <p:cNvPr id="27" name="Rectangle 26"/>
-          <p:cNvSpPr/>
-          <p:nvPr/>
-        </p:nvSpPr>
-        <p:spPr>
-          <a:xfrm>
-            <a:off x="3667539" y="3352800"/>
-            <a:ext cx="1828800" cy="914400"/>
-          </a:xfrm>
-          <a:prstGeom prst="rect">
-            <a:avLst/>
-          </a:prstGeom>
-        </p:spPr>
-        <p:style>
-          <a:lnRef idx="2">
-            <a:schemeClr val="accent1">
-              <a:shade val="50000"/>
-            </a:schemeClr>
-          </a:lnRef>
-          <a:fillRef idx="1">
-            <a:schemeClr val="accent1"/>
-          </a:fillRef>
-          <a:effectRef idx="0">
-            <a:schemeClr val="accent1"/>
-          </a:effectRef>
-          <a:fontRef idx="minor">
-            <a:schemeClr val="lt1"/>
-          </a:fontRef>
-        </p:style>
-        <p:txBody>
-          <a:bodyPr rtlCol="0" anchor="ctr"/>
-          <a:lstStyle/>
-          <a:p>
-            <a:pPr algn="ctr"/>
-            <a:r>
-              <a:rPr lang="en-US" sz="2400" b="1" dirty="0" smtClean="0">
-                <a:solidFill>
-                  <a:schemeClr val="accent6"/>
-                </a:solidFill>
-              </a:rPr>
-              <a:t>Population</a:t>
-            </a:r>
-          </a:p>
-          <a:p>
-            <a:pPr algn="ctr"/>
-            <a:r>
-              <a:rPr lang="en-US" sz="2400" b="1" dirty="0" smtClean="0">
-                <a:solidFill>
-                  <a:schemeClr val="accent6"/>
-                </a:solidFill>
-              </a:rPr>
-              <a:t>Biomass</a:t>
-            </a:r>
-            <a:endParaRPr lang="en-US" sz="2400" b="1" dirty="0">
-              <a:solidFill>
-                <a:schemeClr val="accent6"/>
-              </a:solidFill>
-            </a:endParaRPr>
-          </a:p>
-        </p:txBody>
-      </p:sp>
-      <p:cxnSp>
-        <p:nvCxnSpPr>
-          <p:cNvPr id="34" name="Straight Arrow Connector 33"/>
-          <p:cNvCxnSpPr>
-            <a:endCxn id="27" idx="2"/>
-          </p:cNvCxnSpPr>
-          <p:nvPr/>
-        </p:nvCxnSpPr>
-        <p:spPr>
-          <a:xfrm flipH="1" flipV="1">
-            <a:off x="4581939" y="4267200"/>
-            <a:ext cx="3110" cy="533400"/>
-          </a:xfrm>
-          <a:prstGeom prst="straightConnector1">
-            <a:avLst/>
-          </a:prstGeom>
-          <a:ln w="50800" cap="flat">
-            <a:solidFill>
-              <a:srgbClr val="33CC33"/>
-            </a:solidFill>
-            <a:round/>
-            <a:headEnd type="stealth" w="lg" len="med"/>
-            <a:tailEnd type="stealth" w="lg" len="lg"/>
-          </a:ln>
-        </p:spPr>
-        <p:style>
-          <a:lnRef idx="1">
-            <a:schemeClr val="accent1"/>
-          </a:lnRef>
-          <a:fillRef idx="0">
-            <a:schemeClr val="accent1"/>
-          </a:fillRef>
-          <a:effectRef idx="0">
-            <a:schemeClr val="accent1"/>
-          </a:effectRef>
-          <a:fontRef idx="minor">
-            <a:schemeClr val="tx1"/>
-          </a:fontRef>
-        </p:style>
-      </p:cxnSp>
-      <p:sp>
-        <p:nvSpPr>
-          <p:cNvPr id="35" name="Rectangle 34"/>
-          <p:cNvSpPr/>
-          <p:nvPr/>
-        </p:nvSpPr>
-        <p:spPr>
-          <a:xfrm>
-            <a:off x="3718688" y="4800600"/>
-            <a:ext cx="1691640" cy="640080"/>
-          </a:xfrm>
-          <a:prstGeom prst="rect">
-            <a:avLst/>
-          </a:prstGeom>
-          <a:solidFill>
-            <a:srgbClr val="C0E399"/>
-          </a:solidFill>
-          <a:ln>
-            <a:solidFill>
-              <a:srgbClr val="33CC33"/>
-            </a:solidFill>
-          </a:ln>
-        </p:spPr>
-        <p:style>
-          <a:lnRef idx="2">
-            <a:schemeClr val="accent1">
-              <a:shade val="50000"/>
-            </a:schemeClr>
-          </a:lnRef>
-          <a:fillRef idx="1">
-            <a:schemeClr val="accent1"/>
-          </a:fillRef>
-          <a:effectRef idx="0">
-            <a:schemeClr val="accent1"/>
-          </a:effectRef>
-          <a:fontRef idx="minor">
-            <a:schemeClr val="lt1"/>
-          </a:fontRef>
-        </p:style>
-        <p:txBody>
-          <a:bodyPr rtlCol="0" anchor="ctr"/>
-          <a:lstStyle/>
-          <a:p>
-            <a:pPr algn="ctr"/>
-            <a:r>
-              <a:rPr lang="en-US" sz="2000" b="1" dirty="0" smtClean="0">
-                <a:solidFill>
-                  <a:srgbClr val="009900"/>
-                </a:solidFill>
-              </a:rPr>
-              <a:t>Growth</a:t>
-            </a:r>
-            <a:endParaRPr lang="en-US" sz="2000" b="1" dirty="0">
-              <a:solidFill>
-                <a:srgbClr val="009900"/>
-              </a:solidFill>
-            </a:endParaRPr>
-          </a:p>
-        </p:txBody>
-      </p:sp>
-    </p:spTree>
-    <p:extLst>
-      <p:ext uri="{BB962C8B-B14F-4D97-AF65-F5344CB8AC3E}">
-        <p14:creationId xmlns:p14="http://schemas.microsoft.com/office/powerpoint/2010/main" val="1445208901"/>
-      </p:ext>
-    </p:extLst>
-  </p:cSld>
-  <p:clrMapOvr>
-    <a:masterClrMapping/>
-  </p:clrMapOvr>
-  <p:timing>
-    <p:tnLst>
-      <p:par>
-        <p:cTn id="1" dur="indefinite" restart="never" nodeType="tmRoot">
-          <p:childTnLst>
-            <p:seq concurrent="1" nextAc="seek">
-              <p:cTn id="2" dur="indefinite" nodeType="mainSeq">
-                <p:childTnLst>
-                  <p:par>
-                    <p:cTn id="3" fill="hold">
-                      <p:stCondLst>
-                        <p:cond delay="indefinite"/>
-                      </p:stCondLst>
-                      <p:childTnLst>
-                        <p:par>
-                          <p:cTn id="4" fill="hold">
-                            <p:stCondLst>
-                              <p:cond delay="0"/>
-                            </p:stCondLst>
-                            <p:childTnLst>
-                              <p:par>
-                                <p:cTn id="5" presetID="1" presetClass="entr" presetSubtype="0" fill="hold" grpId="0" nodeType="clickEffect">
-                                  <p:stCondLst>
-                                    <p:cond delay="0"/>
-                                  </p:stCondLst>
-                                  <p:childTnLst>
-                                    <p:set>
-                                      <p:cBhvr>
-                                        <p:cTn id="6" dur="1" fill="hold">
-                                          <p:stCondLst>
-                                            <p:cond delay="0"/>
-                                          </p:stCondLst>
-                                        </p:cTn>
-                                        <p:tgtEl>
-                                          <p:spTgt spid="23"/>
-                                        </p:tgtEl>
-                                        <p:attrNameLst>
-                                          <p:attrName>style.visibility</p:attrName>
-                                        </p:attrNameLst>
-                                      </p:cBhvr>
-                                      <p:to>
-                                        <p:strVal val="visible"/>
-                                      </p:to>
-                                    </p:set>
-                                  </p:childTnLst>
-                                </p:cTn>
-                              </p:par>
-                            </p:childTnLst>
-                          </p:cTn>
-                        </p:par>
-                      </p:childTnLst>
-                    </p:cTn>
-                  </p:par>
-                  <p:par>
-                    <p:cTn id="7" fill="hold">
-                      <p:stCondLst>
-                        <p:cond delay="indefinite"/>
-                      </p:stCondLst>
-                      <p:childTnLst>
-                        <p:par>
-                          <p:cTn id="8" fill="hold">
-                            <p:stCondLst>
-                              <p:cond delay="0"/>
-                            </p:stCondLst>
-                            <p:childTnLst>
-                              <p:par>
-                                <p:cTn id="9" presetID="1" presetClass="entr" presetSubtype="0" fill="hold" grpId="0" nodeType="clickEffect">
-                                  <p:stCondLst>
-                                    <p:cond delay="0"/>
-                                  </p:stCondLst>
-                                  <p:childTnLst>
-                                    <p:set>
-                                      <p:cBhvr>
-                                        <p:cTn id="10" dur="1" fill="hold">
-                                          <p:stCondLst>
-                                            <p:cond delay="0"/>
-                                          </p:stCondLst>
-                                        </p:cTn>
-                                        <p:tgtEl>
-                                          <p:spTgt spid="25"/>
-                                        </p:tgtEl>
-                                        <p:attrNameLst>
-                                          <p:attrName>style.visibility</p:attrName>
-                                        </p:attrNameLst>
-                                      </p:cBhvr>
-                                      <p:to>
-                                        <p:strVal val="visible"/>
-                                      </p:to>
-                                    </p:set>
-                                  </p:childTnLst>
-                                </p:cTn>
-                              </p:par>
-                            </p:childTnLst>
-                          </p:cTn>
-                        </p:par>
-                      </p:childTnLst>
-                    </p:cTn>
-                  </p:par>
-                  <p:par>
-                    <p:cTn id="11" fill="hold">
-                      <p:stCondLst>
-                        <p:cond delay="indefinite"/>
-                      </p:stCondLst>
-                      <p:childTnLst>
-                        <p:par>
-                          <p:cTn id="12" fill="hold">
-                            <p:stCondLst>
-                              <p:cond delay="0"/>
-                            </p:stCondLst>
-                            <p:childTnLst>
-                              <p:par>
-                                <p:cTn id="13" presetID="1" presetClass="entr" presetSubtype="0" fill="hold" grpId="0" nodeType="clickEffect">
-                                  <p:stCondLst>
-                                    <p:cond delay="0"/>
-                                  </p:stCondLst>
-                                  <p:childTnLst>
-                                    <p:set>
-                                      <p:cBhvr>
-                                        <p:cTn id="14" dur="1" fill="hold">
-                                          <p:stCondLst>
-                                            <p:cond delay="0"/>
-                                          </p:stCondLst>
-                                        </p:cTn>
-                                        <p:tgtEl>
-                                          <p:spTgt spid="31"/>
-                                        </p:tgtEl>
-                                        <p:attrNameLst>
-                                          <p:attrName>style.visibility</p:attrName>
-                                        </p:attrNameLst>
-                                      </p:cBhvr>
-                                      <p:to>
-                                        <p:strVal val="visible"/>
-                                      </p:to>
-                                    </p:set>
-                                  </p:childTnLst>
-                                </p:cTn>
-                              </p:par>
-                            </p:childTnLst>
-                          </p:cTn>
-                        </p:par>
-                      </p:childTnLst>
-                    </p:cTn>
-                  </p:par>
-                  <p:par>
-                    <p:cTn id="15" fill="hold">
-                      <p:stCondLst>
-                        <p:cond delay="indefinite"/>
-                      </p:stCondLst>
-                      <p:childTnLst>
-                        <p:par>
-                          <p:cTn id="16" fill="hold">
-                            <p:stCondLst>
-                              <p:cond delay="0"/>
-                            </p:stCondLst>
-                            <p:childTnLst>
-                              <p:par>
-                                <p:cTn id="17" presetID="1" presetClass="entr" presetSubtype="0" fill="hold" grpId="0" nodeType="clickEffect">
-                                  <p:stCondLst>
-                                    <p:cond delay="0"/>
-                                  </p:stCondLst>
-                                  <p:childTnLst>
-                                    <p:set>
-                                      <p:cBhvr>
-                                        <p:cTn id="18" dur="1" fill="hold">
-                                          <p:stCondLst>
-                                            <p:cond delay="0"/>
-                                          </p:stCondLst>
-                                        </p:cTn>
-                                        <p:tgtEl>
-                                          <p:spTgt spid="32"/>
-                                        </p:tgtEl>
-                                        <p:attrNameLst>
-                                          <p:attrName>style.visibility</p:attrName>
-                                        </p:attrNameLst>
-                                      </p:cBhvr>
-                                      <p:to>
-                                        <p:strVal val="visible"/>
-                                      </p:to>
-                                    </p:set>
-                                  </p:childTnLst>
-                                </p:cTn>
-                              </p:par>
-                            </p:childTnLst>
-                          </p:cTn>
-                        </p:par>
-                      </p:childTnLst>
-                    </p:cTn>
-                  </p:par>
-                  <p:par>
-                    <p:cTn id="19" fill="hold">
-                      <p:stCondLst>
-                        <p:cond delay="indefinite"/>
-                      </p:stCondLst>
-                      <p:childTnLst>
-                        <p:par>
-                          <p:cTn id="20" fill="hold">
-                            <p:stCondLst>
-                              <p:cond delay="0"/>
-                            </p:stCondLst>
-                            <p:childTnLst>
-                              <p:par>
-                                <p:cTn id="21" presetID="1" presetClass="entr" presetSubtype="0" fill="hold" grpId="0" nodeType="clickEffect">
-                                  <p:stCondLst>
-                                    <p:cond delay="0"/>
-                                  </p:stCondLst>
-                                  <p:childTnLst>
-                                    <p:set>
-                                      <p:cBhvr>
-                                        <p:cTn id="22" dur="1" fill="hold">
-                                          <p:stCondLst>
-                                            <p:cond delay="0"/>
-                                          </p:stCondLst>
-                                        </p:cTn>
-                                        <p:tgtEl>
-                                          <p:spTgt spid="33"/>
-                                        </p:tgtEl>
-                                        <p:attrNameLst>
-                                          <p:attrName>style.visibility</p:attrName>
-                                        </p:attrNameLst>
-                                      </p:cBhvr>
-                                      <p:to>
-                                        <p:strVal val="visible"/>
-                                      </p:to>
-                                    </p:set>
-                                  </p:childTnLst>
-                                </p:cTn>
-                              </p:par>
-                            </p:childTnLst>
-                          </p:cTn>
-                        </p:par>
-                      </p:childTnLst>
-                    </p:cTn>
-                  </p:par>
-                  <p:par>
-                    <p:cTn id="23" fill="hold">
-                      <p:stCondLst>
-                        <p:cond delay="indefinite"/>
-                      </p:stCondLst>
-                      <p:childTnLst>
-                        <p:par>
-                          <p:cTn id="24" fill="hold">
-                            <p:stCondLst>
-                              <p:cond delay="0"/>
-                            </p:stCondLst>
-                            <p:childTnLst>
-                              <p:par>
-                                <p:cTn id="25" presetID="53" presetClass="exit" presetSubtype="32" fill="hold" grpId="0" nodeType="clickEffect">
-                                  <p:stCondLst>
-                                    <p:cond delay="0"/>
-                                  </p:stCondLst>
-                                  <p:childTnLst>
-                                    <p:anim calcmode="lin" valueType="num">
-                                      <p:cBhvr>
-                                        <p:cTn id="26" dur="2000"/>
-                                        <p:tgtEl>
-                                          <p:spTgt spid="15"/>
-                                        </p:tgtEl>
-                                        <p:attrNameLst>
-                                          <p:attrName>ppt_w</p:attrName>
-                                        </p:attrNameLst>
-                                      </p:cBhvr>
-                                      <p:tavLst>
-                                        <p:tav tm="0">
-                                          <p:val>
-                                            <p:strVal val="ppt_w"/>
-                                          </p:val>
-                                        </p:tav>
-                                        <p:tav tm="100000">
-                                          <p:val>
-                                            <p:fltVal val="0"/>
-                                          </p:val>
-                                        </p:tav>
-                                      </p:tavLst>
-                                    </p:anim>
-                                    <p:anim calcmode="lin" valueType="num">
-                                      <p:cBhvr>
-                                        <p:cTn id="27" dur="2000"/>
-                                        <p:tgtEl>
-                                          <p:spTgt spid="15"/>
-                                        </p:tgtEl>
-                                        <p:attrNameLst>
-                                          <p:attrName>ppt_h</p:attrName>
-                                        </p:attrNameLst>
-                                      </p:cBhvr>
-                                      <p:tavLst>
-                                        <p:tav tm="0">
-                                          <p:val>
-                                            <p:strVal val="ppt_h"/>
-                                          </p:val>
-                                        </p:tav>
-                                        <p:tav tm="100000">
-                                          <p:val>
-                                            <p:fltVal val="0"/>
-                                          </p:val>
-                                        </p:tav>
-                                      </p:tavLst>
-                                    </p:anim>
-                                    <p:animEffect transition="out" filter="fade">
-                                      <p:cBhvr>
-                                        <p:cTn id="28" dur="2000"/>
-                                        <p:tgtEl>
-                                          <p:spTgt spid="15"/>
-                                        </p:tgtEl>
-                                      </p:cBhvr>
-                                    </p:animEffect>
-                                    <p:set>
-                                      <p:cBhvr>
-                                        <p:cTn id="29" dur="1" fill="hold">
-                                          <p:stCondLst>
-                                            <p:cond delay="1999"/>
-                                          </p:stCondLst>
-                                        </p:cTn>
-                                        <p:tgtEl>
-                                          <p:spTgt spid="15"/>
-                                        </p:tgtEl>
-                                        <p:attrNameLst>
-                                          <p:attrName>style.visibility</p:attrName>
-                                        </p:attrNameLst>
-                                      </p:cBhvr>
-                                      <p:to>
-                                        <p:strVal val="hidden"/>
-                                      </p:to>
-                                    </p:set>
-                                  </p:childTnLst>
-                                </p:cTn>
-                              </p:par>
-                              <p:par>
-                                <p:cTn id="30" presetID="53" presetClass="entr" presetSubtype="16" fill="hold" grpId="0" nodeType="withEffect">
-                                  <p:stCondLst>
-                                    <p:cond delay="0"/>
-                                  </p:stCondLst>
-                                  <p:childTnLst>
-                                    <p:set>
-                                      <p:cBhvr>
-                                        <p:cTn id="31" dur="1" fill="hold">
-                                          <p:stCondLst>
-                                            <p:cond delay="0"/>
-                                          </p:stCondLst>
-                                        </p:cTn>
-                                        <p:tgtEl>
-                                          <p:spTgt spid="27"/>
-                                        </p:tgtEl>
-                                        <p:attrNameLst>
-                                          <p:attrName>style.visibility</p:attrName>
-                                        </p:attrNameLst>
-                                      </p:cBhvr>
-                                      <p:to>
-                                        <p:strVal val="visible"/>
-                                      </p:to>
-                                    </p:set>
-                                    <p:anim calcmode="lin" valueType="num">
-                                      <p:cBhvr>
-                                        <p:cTn id="32" dur="2000" fill="hold"/>
-                                        <p:tgtEl>
-                                          <p:spTgt spid="27"/>
-                                        </p:tgtEl>
-                                        <p:attrNameLst>
-                                          <p:attrName>ppt_w</p:attrName>
-                                        </p:attrNameLst>
-                                      </p:cBhvr>
-                                      <p:tavLst>
-                                        <p:tav tm="0">
-                                          <p:val>
-                                            <p:fltVal val="0"/>
-                                          </p:val>
-                                        </p:tav>
-                                        <p:tav tm="100000">
-                                          <p:val>
-                                            <p:strVal val="#ppt_w"/>
-                                          </p:val>
-                                        </p:tav>
-                                      </p:tavLst>
-                                    </p:anim>
-                                    <p:anim calcmode="lin" valueType="num">
-                                      <p:cBhvr>
-                                        <p:cTn id="33" dur="2000" fill="hold"/>
-                                        <p:tgtEl>
-                                          <p:spTgt spid="27"/>
-                                        </p:tgtEl>
-                                        <p:attrNameLst>
-                                          <p:attrName>ppt_h</p:attrName>
-                                        </p:attrNameLst>
-                                      </p:cBhvr>
-                                      <p:tavLst>
-                                        <p:tav tm="0">
-                                          <p:val>
-                                            <p:fltVal val="0"/>
-                                          </p:val>
-                                        </p:tav>
-                                        <p:tav tm="100000">
-                                          <p:val>
-                                            <p:strVal val="#ppt_h"/>
-                                          </p:val>
-                                        </p:tav>
-                                      </p:tavLst>
-                                    </p:anim>
-                                    <p:animEffect transition="in" filter="fade">
-                                      <p:cBhvr>
-                                        <p:cTn id="34" dur="2000"/>
-                                        <p:tgtEl>
-                                          <p:spTgt spid="27"/>
-                                        </p:tgtEl>
-                                      </p:cBhvr>
-                                    </p:animEffect>
-                                  </p:childTnLst>
-                                </p:cTn>
-                              </p:par>
-                            </p:childTnLst>
-                          </p:cTn>
-                        </p:par>
-                        <p:par>
-                          <p:cTn id="35" fill="hold">
-                            <p:stCondLst>
-                              <p:cond delay="2000"/>
-                            </p:stCondLst>
-                            <p:childTnLst>
-                              <p:par>
-                                <p:cTn id="36" presetID="22" presetClass="entr" presetSubtype="4" fill="hold" nodeType="afterEffect">
-                                  <p:stCondLst>
-                                    <p:cond delay="0"/>
-                                  </p:stCondLst>
-                                  <p:childTnLst>
-                                    <p:set>
-                                      <p:cBhvr>
-                                        <p:cTn id="37" dur="1" fill="hold">
-                                          <p:stCondLst>
-                                            <p:cond delay="0"/>
-                                          </p:stCondLst>
-                                        </p:cTn>
-                                        <p:tgtEl>
-                                          <p:spTgt spid="34"/>
-                                        </p:tgtEl>
-                                        <p:attrNameLst>
-                                          <p:attrName>style.visibility</p:attrName>
-                                        </p:attrNameLst>
-                                      </p:cBhvr>
-                                      <p:to>
-                                        <p:strVal val="visible"/>
-                                      </p:to>
-                                    </p:set>
-                                    <p:animEffect transition="in" filter="wipe(down)">
-                                      <p:cBhvr>
-                                        <p:cTn id="38" dur="500"/>
-                                        <p:tgtEl>
-                                          <p:spTgt spid="34"/>
-                                        </p:tgtEl>
-                                      </p:cBhvr>
-                                    </p:animEffect>
-                                  </p:childTnLst>
-                                </p:cTn>
-                              </p:par>
-                            </p:childTnLst>
-                          </p:cTn>
-                        </p:par>
-                      </p:childTnLst>
-                    </p:cTn>
-                  </p:par>
-                  <p:par>
-                    <p:cTn id="39" fill="hold">
-                      <p:stCondLst>
-                        <p:cond delay="indefinite"/>
-                      </p:stCondLst>
-                      <p:childTnLst>
-                        <p:par>
-                          <p:cTn id="40" fill="hold">
-                            <p:stCondLst>
-                              <p:cond delay="0"/>
-                            </p:stCondLst>
-                            <p:childTnLst>
-                              <p:par>
-                                <p:cTn id="41" presetID="1" presetClass="entr" presetSubtype="0" fill="hold" grpId="0" nodeType="clickEffect">
-                                  <p:stCondLst>
-                                    <p:cond delay="0"/>
-                                  </p:stCondLst>
-                                  <p:childTnLst>
-                                    <p:set>
-                                      <p:cBhvr>
-                                        <p:cTn id="42" dur="1" fill="hold">
-                                          <p:stCondLst>
-                                            <p:cond delay="0"/>
-                                          </p:stCondLst>
-                                        </p:cTn>
-                                        <p:tgtEl>
-                                          <p:spTgt spid="35"/>
-                                        </p:tgtEl>
-                                        <p:attrNameLst>
-                                          <p:attrName>style.visibility</p:attrName>
-                                        </p:attrNameLst>
-                                      </p:cBhvr>
-                                      <p:to>
-                                        <p:strVal val="visible"/>
-                                      </p:to>
-                                    </p:set>
-                                  </p:childTnLst>
-                                </p:cTn>
-                              </p:par>
-                            </p:childTnLst>
-                          </p:cTn>
-                        </p:par>
-                      </p:childTnLst>
-                    </p:cTn>
-                  </p:par>
-                </p:childTnLst>
-              </p:cTn>
-              <p:prevCondLst>
-                <p:cond evt="onPrev" delay="0">
-                  <p:tgtEl>
-                    <p:sldTgt/>
-                  </p:tgtEl>
-                </p:cond>
-              </p:prevCondLst>
-              <p:nextCondLst>
-                <p:cond evt="onNext" delay="0">
-                  <p:tgtEl>
-                    <p:sldTgt/>
-                  </p:tgtEl>
-                </p:cond>
-              </p:nextCondLst>
-            </p:seq>
-          </p:childTnLst>
-        </p:cTn>
-      </p:par>
-    </p:tnLst>
-    <p:bldLst>
-      <p:bldP spid="15" grpId="0" animBg="1"/>
-      <p:bldP spid="23" grpId="0" animBg="1"/>
-      <p:bldP spid="25" grpId="0" animBg="1"/>
-      <p:bldP spid="31" grpId="0" animBg="1"/>
-      <p:bldP spid="32" grpId="0" animBg="1"/>
-      <p:bldP spid="33" grpId="0" animBg="1"/>
-      <p:bldP spid="27" grpId="0" animBg="1"/>
-      <p:bldP spid="35" grpId="0" animBg="1"/>
-    </p:bldLst>
-  </p:timing>
-</p:sld>
-</file>
-
-<file path=ppt/slides/slide3.xml><?xml version="1.0" encoding="utf-8"?>
-<p:sld xmlns:a="http://schemas.openxmlformats.org/drawingml/2006/main" xmlns:r="http://schemas.openxmlformats.org/officeDocument/2006/relationships" xmlns:p="http://schemas.openxmlformats.org/presentationml/2006/main">
-  <p:cSld>
-    <p:spTree>
-      <p:nvGrpSpPr>
-        <p:cNvPr id="1" name=""/>
-        <p:cNvGrpSpPr/>
-        <p:nvPr/>
-      </p:nvGrpSpPr>
-      <p:grpSpPr>
-        <a:xfrm>
-          <a:off x="0" y="0"/>
-          <a:ext cx="0" cy="0"/>
-          <a:chOff x="0" y="0"/>
-          <a:chExt cx="0" cy="0"/>
-        </a:xfrm>
-      </p:grpSpPr>
-      <p:sp>
-        <p:nvSpPr>
-          <p:cNvPr id="2" name="Title 1"/>
-          <p:cNvSpPr>
-            <a:spLocks noGrp="1"/>
-          </p:cNvSpPr>
-          <p:nvPr>
-            <p:ph type="title"/>
-          </p:nvPr>
-        </p:nvSpPr>
-        <p:spPr>
-          <a:xfrm>
-            <a:off x="65088" y="0"/>
-            <a:ext cx="9012237" cy="597932"/>
-          </a:xfrm>
-        </p:spPr>
-        <p:txBody>
-          <a:bodyPr/>
-          <a:lstStyle/>
-          <a:p>
-            <a:r>
-              <a:rPr lang="en-US" dirty="0" smtClean="0"/>
-              <a:t>Environments of a Stock</a:t>
-            </a:r>
-            <a:endParaRPr lang="en-US" dirty="0"/>
-          </a:p>
-        </p:txBody>
-      </p:sp>
-      <p:sp>
-        <p:nvSpPr>
-          <p:cNvPr id="4" name="Footer Placeholder 3"/>
-          <p:cNvSpPr>
-            <a:spLocks noGrp="1"/>
-          </p:cNvSpPr>
-          <p:nvPr>
-            <p:ph type="ftr" sz="quarter" idx="10"/>
-          </p:nvPr>
-        </p:nvSpPr>
-        <p:spPr/>
-        <p:txBody>
-          <a:bodyPr/>
-          <a:lstStyle/>
-          <a:p>
-            <a:pPr>
-              <a:defRPr/>
-            </a:pPr>
-            <a:r>
-              <a:rPr lang="en-US" smtClean="0"/>
-              <a:t>Stock Concept</a:t>
-            </a:r>
-            <a:endParaRPr lang="en-US"/>
-          </a:p>
-        </p:txBody>
-      </p:sp>
-      <p:sp>
-        <p:nvSpPr>
-          <p:cNvPr id="5" name="Slide Number Placeholder 4"/>
-          <p:cNvSpPr>
-            <a:spLocks noGrp="1"/>
-          </p:cNvSpPr>
-          <p:nvPr>
-            <p:ph type="sldNum" sz="quarter" idx="11"/>
-          </p:nvPr>
-        </p:nvSpPr>
-        <p:spPr/>
-        <p:txBody>
-          <a:bodyPr/>
-          <a:lstStyle/>
-          <a:p>
-            <a:pPr>
-              <a:defRPr/>
-            </a:pPr>
-            <a:fld id="{A4C5663D-8A97-4D07-AE54-B897400713C4}" type="slidenum">
-              <a:rPr lang="en-US" smtClean="0"/>
-              <a:pPr>
-                <a:defRPr/>
-              </a:pPr>
-              <a:t>3</a:t>
+              <a:t>1</a:t>
             </a:fld>
             <a:endParaRPr lang="en-US"/>
           </a:p>
@@ -7493,7 +5172,7 @@
     </p:spTree>
     <p:extLst>
       <p:ext uri="{BB962C8B-B14F-4D97-AF65-F5344CB8AC3E}">
-        <p14:creationId xmlns:p14="http://schemas.microsoft.com/office/powerpoint/2010/main" val="3629451269"/>
+        <p14:creationId xmlns:p14="http://schemas.microsoft.com/office/powerpoint/2010/main" val="1128526556"/>
       </p:ext>
     </p:extLst>
   </p:cSld>
@@ -7534,6 +5213,42 @@
                                           </p:stCondLst>
                                         </p:cTn>
                                         <p:tgtEl>
+                                          <p:spTgt spid="10"/>
+                                        </p:tgtEl>
+                                        <p:attrNameLst>
+                                          <p:attrName>style.visibility</p:attrName>
+                                        </p:attrNameLst>
+                                      </p:cBhvr>
+                                      <p:to>
+                                        <p:strVal val="visible"/>
+                                      </p:to>
+                                    </p:set>
+                                  </p:childTnLst>
+                                </p:cTn>
+                              </p:par>
+                            </p:childTnLst>
+                          </p:cTn>
+                        </p:par>
+                        <p:par>
+                          <p:cTn id="7" fill="hold">
+                            <p:stCondLst>
+                              <p:cond delay="0"/>
+                            </p:stCondLst>
+                            <p:childTnLst>
+                              <p:par>
+                                <p:cTn id="8" presetID="1" presetClass="entr" presetSubtype="0" fill="hold" grpId="0" nodeType="afterEffect">
+                                  <p:stCondLst>
+                                    <p:cond delay="0"/>
+                                  </p:stCondLst>
+                                  <p:childTnLst>
+                                    <p:set>
+                                      <p:cBhvr>
+                                        <p:cTn id="9" dur="1" fill="hold">
+                                          <p:stCondLst>
+                                            <p:cond delay="0"/>
+                                          </p:stCondLst>
+                                        </p:cTn>
+                                        <p:tgtEl>
                                           <p:spTgt spid="11"/>
                                         </p:tgtEl>
                                         <p:attrNameLst>
@@ -7554,26 +5269,26 @@
                     </p:cTn>
                   </p:par>
                   <p:par>
-                    <p:cTn id="7" fill="hold">
+                    <p:cTn id="10" fill="hold">
                       <p:stCondLst>
                         <p:cond delay="indefinite"/>
                       </p:stCondLst>
                       <p:childTnLst>
                         <p:par>
-                          <p:cTn id="8" fill="hold">
+                          <p:cTn id="11" fill="hold">
                             <p:stCondLst>
                               <p:cond delay="0"/>
                             </p:stCondLst>
                             <p:childTnLst>
                               <p:par>
-                                <p:cTn id="9" presetID="1" presetClass="entr" presetSubtype="0" fill="hold" grpId="1" nodeType="clickEffect">
+                                <p:cTn id="12" presetID="1" presetClass="entr" presetSubtype="0" fill="hold" grpId="1" nodeType="clickEffect">
                                   <p:stCondLst>
                                     <p:cond delay="0"/>
                                   </p:stCondLst>
                                   <p:childTnLst>
                                     <p:set>
                                       <p:cBhvr>
-                                        <p:cTn id="10" dur="1" fill="hold">
+                                        <p:cTn id="13" dur="1" fill="hold">
                                           <p:stCondLst>
                                             <p:cond delay="0"/>
                                           </p:stCondLst>
@@ -7593,14 +5308,14 @@
                                 </p:cTn>
                               </p:par>
                               <p:par>
-                                <p:cTn id="11" presetID="1" presetClass="entr" presetSubtype="0" fill="hold" grpId="1" nodeType="withEffect">
+                                <p:cTn id="14" presetID="1" presetClass="entr" presetSubtype="0" fill="hold" grpId="1" nodeType="withEffect">
                                   <p:stCondLst>
                                     <p:cond delay="0"/>
                                   </p:stCondLst>
                                   <p:childTnLst>
                                     <p:set>
                                       <p:cBhvr>
-                                        <p:cTn id="12" dur="1" fill="hold">
+                                        <p:cTn id="15" dur="1" fill="hold">
                                           <p:stCondLst>
                                             <p:cond delay="0"/>
                                           </p:stCondLst>
@@ -7620,14 +5335,14 @@
                                 </p:cTn>
                               </p:par>
                               <p:par>
-                                <p:cTn id="13" presetID="1" presetClass="entr" presetSubtype="0" fill="hold" grpId="1" nodeType="withEffect">
+                                <p:cTn id="16" presetID="1" presetClass="entr" presetSubtype="0" fill="hold" grpId="1" nodeType="withEffect">
                                   <p:stCondLst>
                                     <p:cond delay="0"/>
                                   </p:stCondLst>
                                   <p:childTnLst>
                                     <p:set>
                                       <p:cBhvr>
-                                        <p:cTn id="14" dur="1" fill="hold">
+                                        <p:cTn id="17" dur="1" fill="hold">
                                           <p:stCondLst>
                                             <p:cond delay="0"/>
                                           </p:stCondLst>
@@ -7650,20 +5365,20 @@
                           </p:cTn>
                         </p:par>
                         <p:par>
-                          <p:cTn id="15" fill="hold">
+                          <p:cTn id="18" fill="hold">
                             <p:stCondLst>
                               <p:cond delay="0"/>
                             </p:stCondLst>
                             <p:childTnLst>
                               <p:par>
-                                <p:cTn id="16" presetID="14" presetClass="path" presetSubtype="0" accel="50000" decel="50000" fill="hold" grpId="0" nodeType="afterEffect">
+                                <p:cTn id="19" presetID="14" presetClass="path" presetSubtype="0" accel="50000" decel="50000" fill="hold" grpId="0" nodeType="afterEffect">
                                   <p:stCondLst>
                                     <p:cond delay="0"/>
                                   </p:stCondLst>
                                   <p:childTnLst>
                                     <p:animMotion origin="layout" path="M -2.22222E-6 -4.45524E-6 L -0.33472 -4.45524E-6 L -0.47014 -0.38445 L -0.13559 -0.38445 L -2.22222E-6 -4.45524E-6 Z " pathEditMode="relative" rAng="0" ptsTypes="FFFFF">
                                       <p:cBhvr>
-                                        <p:cTn id="17" dur="4000" fill="hold"/>
+                                        <p:cTn id="20" dur="4000" fill="hold"/>
                                         <p:tgtEl>
                                           <p:spTgt spid="53"/>
                                         </p:tgtEl>
@@ -7678,14 +5393,14 @@
                                 </p:cTn>
                               </p:par>
                               <p:par>
-                                <p:cTn id="18" presetID="4" presetClass="path" presetSubtype="0" accel="50000" decel="50000" fill="hold" grpId="0" nodeType="withEffect">
+                                <p:cTn id="21" presetID="4" presetClass="path" presetSubtype="0" accel="50000" decel="50000" fill="hold" grpId="0" nodeType="withEffect">
                                   <p:stCondLst>
                                     <p:cond delay="0"/>
                                   </p:stCondLst>
                                   <p:childTnLst>
                                     <p:animMotion origin="layout" path="M -0.02344 0.00277 L 0.16858 9.85427E-7 L 0.31528 0.20611 L 0.16858 0.41059 L -0.12188 0.41059 L -0.26806 0.20611 L -0.02344 0.00277 Z " pathEditMode="relative" rAng="0" ptsTypes="FFFFFFF">
                                       <p:cBhvr>
-                                        <p:cTn id="19" dur="4000" fill="hold"/>
+                                        <p:cTn id="22" dur="4000" fill="hold"/>
                                         <p:tgtEl>
                                           <p:spTgt spid="51"/>
                                         </p:tgtEl>
@@ -7700,14 +5415,14 @@
                                 </p:cTn>
                               </p:par>
                               <p:par>
-                                <p:cTn id="20" presetID="14" presetClass="path" presetSubtype="0" accel="50000" decel="50000" fill="hold" grpId="0" nodeType="withEffect">
+                                <p:cTn id="23" presetID="14" presetClass="path" presetSubtype="0" accel="50000" decel="50000" fill="hold" grpId="0" nodeType="withEffect">
                                   <p:stCondLst>
                                     <p:cond delay="0"/>
                                   </p:stCondLst>
                                   <p:childTnLst>
                                     <p:animMotion origin="layout" path="M 1.94444E-6 3.47444E-6 L 0.33594 3.47444E-6 L 0.47205 -0.43743 L 0.13594 -0.43743 L 1.94444E-6 3.47444E-6 Z " pathEditMode="relative" rAng="0" ptsTypes="FFFFF">
                                       <p:cBhvr>
-                                        <p:cTn id="21" dur="4000" fill="hold"/>
+                                        <p:cTn id="24" dur="4000" fill="hold"/>
                                         <p:tgtEl>
                                           <p:spTgt spid="52"/>
                                         </p:tgtEl>
@@ -7728,26 +5443,26 @@
                     </p:cTn>
                   </p:par>
                   <p:par>
-                    <p:cTn id="22" fill="hold">
+                    <p:cTn id="25" fill="hold">
                       <p:stCondLst>
                         <p:cond delay="indefinite"/>
                       </p:stCondLst>
                       <p:childTnLst>
                         <p:par>
-                          <p:cTn id="23" fill="hold">
+                          <p:cTn id="26" fill="hold">
                             <p:stCondLst>
                               <p:cond delay="0"/>
                             </p:stCondLst>
                             <p:childTnLst>
                               <p:par>
-                                <p:cTn id="24" presetID="6" presetClass="entr" presetSubtype="16" fill="hold" nodeType="clickEffect">
+                                <p:cTn id="27" presetID="6" presetClass="entr" presetSubtype="16" fill="hold" nodeType="clickEffect">
                                   <p:stCondLst>
                                     <p:cond delay="0"/>
                                   </p:stCondLst>
                                   <p:childTnLst>
                                     <p:set>
                                       <p:cBhvr>
-                                        <p:cTn id="25" dur="1" fill="hold">
+                                        <p:cTn id="28" dur="1" fill="hold">
                                           <p:stCondLst>
                                             <p:cond delay="0"/>
                                           </p:stCondLst>
@@ -7765,7 +5480,7 @@
                                     </p:set>
                                     <p:animEffect transition="in" filter="circle(in)">
                                       <p:cBhvr>
-                                        <p:cTn id="26" dur="2000"/>
+                                        <p:cTn id="29" dur="2000"/>
                                         <p:tgtEl>
                                           <p:spTgt spid="13"/>
                                         </p:tgtEl>
@@ -7781,26 +5496,26 @@
                     </p:cTn>
                   </p:par>
                   <p:par>
-                    <p:cTn id="27" fill="hold">
+                    <p:cTn id="30" fill="hold">
                       <p:stCondLst>
                         <p:cond delay="indefinite"/>
                       </p:stCondLst>
                       <p:childTnLst>
                         <p:par>
-                          <p:cTn id="28" fill="hold">
+                          <p:cTn id="31" fill="hold">
                             <p:stCondLst>
                               <p:cond delay="0"/>
                             </p:stCondLst>
                             <p:childTnLst>
                               <p:par>
-                                <p:cTn id="29" presetID="1" presetClass="entr" presetSubtype="0" fill="hold" grpId="1" nodeType="clickEffect">
+                                <p:cTn id="32" presetID="1" presetClass="entr" presetSubtype="0" fill="hold" grpId="1" nodeType="clickEffect">
                                   <p:stCondLst>
                                     <p:cond delay="0"/>
                                   </p:stCondLst>
                                   <p:childTnLst>
                                     <p:set>
                                       <p:cBhvr>
-                                        <p:cTn id="30" dur="1" fill="hold">
+                                        <p:cTn id="33" dur="1" fill="hold">
                                           <p:stCondLst>
                                             <p:cond delay="0"/>
                                           </p:stCondLst>
@@ -7823,20 +5538,20 @@
                           </p:cTn>
                         </p:par>
                         <p:par>
-                          <p:cTn id="31" fill="hold">
+                          <p:cTn id="34" fill="hold">
                             <p:stCondLst>
                               <p:cond delay="0"/>
                             </p:stCondLst>
                             <p:childTnLst>
                               <p:par>
-                                <p:cTn id="32" presetID="20" presetClass="path" presetSubtype="0" accel="50000" decel="50000" fill="hold" grpId="0" nodeType="afterEffect">
+                                <p:cTn id="35" presetID="20" presetClass="path" presetSubtype="0" accel="50000" decel="50000" fill="hold" grpId="0" nodeType="afterEffect">
                                   <p:stCondLst>
                                     <p:cond delay="0"/>
                                   </p:stCondLst>
                                   <p:childTnLst>
                                     <p:animMotion origin="layout" path="M -0.00591 0.00047 C 0.03854 0.00324 0.10191 -0.01898 0.16875 0.00162 C 0.27326 0.00162 0.36024 0.02292 0.36024 0.11111 L 0.3592 0.48727 C 0.3592 0.575 0.36996 0.66968 0.26545 0.66968 L -0.37136 0.67107 C -0.47466 0.67107 -0.48125 0.61528 -0.47136 0.54051 C -0.4757 0.48634 -0.51198 0.12477 -0.43559 0.03519 C -0.37344 -0.05741 -0.16945 -0.00926 -0.09792 -0.01504 C -0.02639 -0.02083 -0.0191 -0.00208 -0.00591 0.00047 Z " pathEditMode="relative" rAng="0" ptsTypes="ffFfFffaaf">
                                       <p:cBhvr>
-                                        <p:cTn id="33" dur="4000" fill="hold"/>
+                                        <p:cTn id="36" dur="4000" fill="hold"/>
                                         <p:tgtEl>
                                           <p:spTgt spid="54"/>
                                         </p:tgtEl>
@@ -7857,26 +5572,26 @@
                     </p:cTn>
                   </p:par>
                   <p:par>
-                    <p:cTn id="34" fill="hold">
+                    <p:cTn id="37" fill="hold">
                       <p:stCondLst>
                         <p:cond delay="indefinite"/>
                       </p:stCondLst>
                       <p:childTnLst>
                         <p:par>
-                          <p:cTn id="35" fill="hold">
+                          <p:cTn id="38" fill="hold">
                             <p:stCondLst>
                               <p:cond delay="0"/>
                             </p:stCondLst>
                             <p:childTnLst>
                               <p:par>
-                                <p:cTn id="36" presetID="6" presetClass="entr" presetSubtype="16" fill="hold" nodeType="clickEffect">
+                                <p:cTn id="39" presetID="6" presetClass="entr" presetSubtype="16" fill="hold" nodeType="clickEffect">
                                   <p:stCondLst>
                                     <p:cond delay="0"/>
                                   </p:stCondLst>
                                   <p:childTnLst>
                                     <p:set>
                                       <p:cBhvr>
-                                        <p:cTn id="37" dur="1" fill="hold">
+                                        <p:cTn id="40" dur="1" fill="hold">
                                           <p:stCondLst>
                                             <p:cond delay="0"/>
                                           </p:stCondLst>
@@ -7894,7 +5609,7 @@
                                     </p:set>
                                     <p:animEffect transition="in" filter="circle(in)">
                                       <p:cBhvr>
-                                        <p:cTn id="38" dur="2000"/>
+                                        <p:cTn id="41" dur="2000"/>
                                         <p:tgtEl>
                                           <p:spTgt spid="14"/>
                                         </p:tgtEl>
@@ -7910,26 +5625,26 @@
                     </p:cTn>
                   </p:par>
                   <p:par>
-                    <p:cTn id="39" fill="hold">
+                    <p:cTn id="42" fill="hold">
                       <p:stCondLst>
                         <p:cond delay="indefinite"/>
                       </p:stCondLst>
                       <p:childTnLst>
                         <p:par>
-                          <p:cTn id="40" fill="hold">
+                          <p:cTn id="43" fill="hold">
                             <p:stCondLst>
                               <p:cond delay="0"/>
                             </p:stCondLst>
                             <p:childTnLst>
                               <p:par>
-                                <p:cTn id="41" presetID="1" presetClass="entr" presetSubtype="0" fill="hold" grpId="1" nodeType="clickEffect">
+                                <p:cTn id="44" presetID="1" presetClass="entr" presetSubtype="0" fill="hold" grpId="1" nodeType="clickEffect">
                                   <p:stCondLst>
                                     <p:cond delay="0"/>
                                   </p:stCondLst>
                                   <p:childTnLst>
                                     <p:set>
                                       <p:cBhvr>
-                                        <p:cTn id="42" dur="1" fill="hold">
+                                        <p:cTn id="45" dur="1" fill="hold">
                                           <p:stCondLst>
                                             <p:cond delay="0"/>
                                           </p:stCondLst>
@@ -7949,14 +5664,14 @@
                                 </p:cTn>
                               </p:par>
                               <p:par>
-                                <p:cTn id="43" presetID="1" presetClass="entr" presetSubtype="0" fill="hold" grpId="1" nodeType="withEffect">
+                                <p:cTn id="46" presetID="1" presetClass="entr" presetSubtype="0" fill="hold" grpId="1" nodeType="withEffect">
                                   <p:stCondLst>
                                     <p:cond delay="0"/>
                                   </p:stCondLst>
                                   <p:childTnLst>
                                     <p:set>
                                       <p:cBhvr>
-                                        <p:cTn id="44" dur="1" fill="hold">
+                                        <p:cTn id="47" dur="1" fill="hold">
                                           <p:stCondLst>
                                             <p:cond delay="0"/>
                                           </p:stCondLst>
@@ -7976,14 +5691,14 @@
                                 </p:cTn>
                               </p:par>
                               <p:par>
-                                <p:cTn id="45" presetID="1" presetClass="entr" presetSubtype="0" fill="hold" grpId="1" nodeType="withEffect">
+                                <p:cTn id="48" presetID="1" presetClass="entr" presetSubtype="0" fill="hold" grpId="1" nodeType="withEffect">
                                   <p:stCondLst>
                                     <p:cond delay="0"/>
                                   </p:stCondLst>
                                   <p:childTnLst>
                                     <p:set>
                                       <p:cBhvr>
-                                        <p:cTn id="46" dur="1" fill="hold">
+                                        <p:cTn id="49" dur="1" fill="hold">
                                           <p:stCondLst>
                                             <p:cond delay="0"/>
                                           </p:stCondLst>
@@ -8003,14 +5718,14 @@
                                 </p:cTn>
                               </p:par>
                               <p:par>
-                                <p:cTn id="47" presetID="1" presetClass="entr" presetSubtype="0" fill="hold" grpId="1" nodeType="withEffect">
+                                <p:cTn id="50" presetID="1" presetClass="entr" presetSubtype="0" fill="hold" grpId="1" nodeType="withEffect">
                                   <p:stCondLst>
                                     <p:cond delay="0"/>
                                   </p:stCondLst>
                                   <p:childTnLst>
                                     <p:set>
                                       <p:cBhvr>
-                                        <p:cTn id="48" dur="1" fill="hold">
+                                        <p:cTn id="51" dur="1" fill="hold">
                                           <p:stCondLst>
                                             <p:cond delay="0"/>
                                           </p:stCondLst>
@@ -8030,14 +5745,14 @@
                                 </p:cTn>
                               </p:par>
                               <p:par>
-                                <p:cTn id="49" presetID="1" presetClass="entr" presetSubtype="0" fill="hold" grpId="1" nodeType="withEffect">
+                                <p:cTn id="52" presetID="1" presetClass="entr" presetSubtype="0" fill="hold" grpId="1" nodeType="withEffect">
                                   <p:stCondLst>
                                     <p:cond delay="0"/>
                                   </p:stCondLst>
                                   <p:childTnLst>
                                     <p:set>
                                       <p:cBhvr>
-                                        <p:cTn id="50" dur="1" fill="hold">
+                                        <p:cTn id="53" dur="1" fill="hold">
                                           <p:stCondLst>
                                             <p:cond delay="0"/>
                                           </p:stCondLst>
@@ -8060,20 +5775,20 @@
                           </p:cTn>
                         </p:par>
                         <p:par>
-                          <p:cTn id="51" fill="hold">
+                          <p:cTn id="54" fill="hold">
                             <p:stCondLst>
                               <p:cond delay="0"/>
                             </p:stCondLst>
                             <p:childTnLst>
                               <p:par>
-                                <p:cTn id="52" presetID="20" presetClass="path" presetSubtype="0" accel="50000" decel="50000" fill="hold" grpId="0" nodeType="afterEffect">
+                                <p:cTn id="55" presetID="20" presetClass="path" presetSubtype="0" accel="50000" decel="50000" fill="hold" grpId="0" nodeType="afterEffect">
                                   <p:stCondLst>
                                     <p:cond delay="0"/>
                                   </p:stCondLst>
                                   <p:childTnLst>
                                     <p:animMotion origin="layout" path="M -0.55364 0.1213 C -0.52587 0.0257 -0.49705 -0.00486 -0.37882 -0.00486 L 0.11684 -0.00486 C 0.2349 -0.00486 0.33177 0.07871 0.33177 0.18149 L 0.33177 0.60487 C 0.33177 0.70764 0.2349 0.79514 0.11684 0.79514 L -0.37882 0.79514 C -0.49705 0.79514 -0.57934 0.21598 -0.55364 0.1213 Z " pathEditMode="relative" rAng="0" ptsTypes="fFfFfFff">
                                       <p:cBhvr>
-                                        <p:cTn id="53" dur="4000" fill="hold"/>
+                                        <p:cTn id="56" dur="4000" fill="hold"/>
                                         <p:tgtEl>
                                           <p:spTgt spid="55"/>
                                         </p:tgtEl>
@@ -8088,14 +5803,14 @@
                                 </p:cTn>
                               </p:par>
                               <p:par>
-                                <p:cTn id="54" presetID="20" presetClass="path" presetSubtype="0" accel="50000" decel="50000" fill="hold" grpId="0" nodeType="withEffect">
+                                <p:cTn id="57" presetID="20" presetClass="path" presetSubtype="0" accel="50000" decel="50000" fill="hold" grpId="0" nodeType="withEffect">
                                   <p:stCondLst>
                                     <p:cond delay="0"/>
                                   </p:stCondLst>
                                   <p:childTnLst>
                                     <p:animMotion origin="layout" path="M -0.54982 0.81806 C -0.66823 0.81806 -0.76562 0.73426 -0.76562 0.63032 L -0.76562 0.19583 C -0.76562 0.09213 -0.66823 0.00694 -0.54982 0.00694 L -0.05902 0.00694 C 0.05938 0.00694 0.15973 0.09213 0.15973 0.19583 L 0.15973 0.63032 C 0.15973 0.73426 0.05938 0.81806 -0.05902 0.81806 Z " pathEditMode="relative" rAng="16200000" ptsTypes="fFfFfFff">
                                       <p:cBhvr>
-                                        <p:cTn id="55" dur="4000" fill="hold"/>
+                                        <p:cTn id="58" dur="4000" fill="hold"/>
                                         <p:tgtEl>
                                           <p:spTgt spid="57"/>
                                         </p:tgtEl>
@@ -8110,14 +5825,14 @@
                                 </p:cTn>
                               </p:par>
                               <p:par>
-                                <p:cTn id="56" presetID="20" presetClass="path" presetSubtype="0" accel="50000" decel="50000" fill="hold" grpId="0" nodeType="withEffect">
+                                <p:cTn id="59" presetID="20" presetClass="path" presetSubtype="0" accel="50000" decel="50000" fill="hold" grpId="0" nodeType="withEffect">
                                   <p:stCondLst>
                                     <p:cond delay="0"/>
                                   </p:stCondLst>
                                   <p:childTnLst>
                                     <p:animMotion origin="layout" path="M 0.41736 -0.81528 C 0.53716 -0.81528 0.63542 -0.73125 0.63542 -0.62755 L 0.63542 -0.19259 C 0.63542 -0.08889 0.53716 -0.00417 0.41736 -0.00417 L -0.0776 -0.00417 C -0.19722 -0.00417 -0.29757 -0.08889 -0.29757 -0.19259 L -0.27083 -0.63171 C -0.27083 -0.73542 -0.19722 -0.81528 -0.0776 -0.81528 Z " pathEditMode="relative" rAng="0" ptsTypes="fFfFfFff">
                                       <p:cBhvr>
-                                        <p:cTn id="57" dur="4000" spd="-100000" fill="hold"/>
+                                        <p:cTn id="60" dur="4000" spd="-100000" fill="hold"/>
                                         <p:tgtEl>
                                           <p:spTgt spid="60"/>
                                         </p:tgtEl>
@@ -8132,14 +5847,14 @@
                                 </p:cTn>
                               </p:par>
                               <p:par>
-                                <p:cTn id="58" presetID="20" presetClass="path" presetSubtype="0" accel="50000" decel="50000" fill="hold" grpId="0" nodeType="withEffect">
+                                <p:cTn id="61" presetID="20" presetClass="path" presetSubtype="0" accel="50000" decel="50000" fill="hold" grpId="0" nodeType="withEffect">
                                   <p:stCondLst>
                                     <p:cond delay="0"/>
                                   </p:stCondLst>
                                   <p:childTnLst>
                                     <p:animMotion origin="layout" path="M 0.06233 -0.79884 C 0.08993 -0.80787 0.36059 -0.86736 0.40833 -0.78866 L 0.45139 -0.65255 C 0.46302 -0.55579 0.44479 -0.06389 0.42621 -0.04352 L -0.03802 0.00417 C -0.0566 0.02407 -0.41424 0.04144 -0.46233 -0.03796 L -0.47743 -0.73356 C -0.45278 -0.82245 0.03194 -0.79236 0.06233 -0.79884 Z " pathEditMode="relative" rAng="0" ptsTypes="fFfFfFff">
                                       <p:cBhvr>
-                                        <p:cTn id="59" dur="4000" fill="hold"/>
+                                        <p:cTn id="62" dur="4000" fill="hold"/>
                                         <p:tgtEl>
                                           <p:spTgt spid="59"/>
                                         </p:tgtEl>
@@ -8154,14 +5869,14 @@
                                 </p:cTn>
                               </p:par>
                               <p:par>
-                                <p:cTn id="60" presetID="20" presetClass="path" presetSubtype="0" accel="50000" decel="50000" fill="hold" grpId="0" nodeType="withEffect">
+                                <p:cTn id="63" presetID="20" presetClass="path" presetSubtype="0" accel="50000" decel="50000" fill="hold" grpId="0" nodeType="withEffect">
                                   <p:stCondLst>
                                     <p:cond delay="0"/>
                                   </p:stCondLst>
                                   <p:childTnLst>
                                     <p:animMotion origin="layout" path="M -0.68698 -0.01388 C -0.79618 -0.08929 -0.75417 -0.47213 -0.74045 -0.59172 C -0.73976 -0.72195 -0.72222 -0.75989 -0.68264 -0.79528 L -0.50261 -0.80361 C -0.44792 -0.78811 0.02083 -0.8929 0.09635 -0.79806 L 0.16667 -0.69975 C 0.2066 -0.59172 0.19566 -0.07055 0.17413 -0.03933 L -0.01788 0.01087 C -0.03941 0.04141 -0.57761 0.01827 -0.68698 -0.01388 Z " pathEditMode="relative" rAng="0" ptsTypes="faFfFfFff">
                                       <p:cBhvr>
-                                        <p:cTn id="61" dur="4000" spd="-100000" fill="hold"/>
+                                        <p:cTn id="64" dur="4000" spd="-100000" fill="hold"/>
                                         <p:tgtEl>
                                           <p:spTgt spid="58"/>
                                         </p:tgtEl>
@@ -8203,6 +5918,7 @@
       </p:par>
     </p:tnLst>
     <p:bldLst>
+      <p:bldP spid="10" grpId="0" animBg="1"/>
       <p:bldP spid="11" grpId="0"/>
       <p:bldP spid="51" grpId="0"/>
       <p:bldP spid="51" grpId="1"/>
@@ -8223,668 +5939,6 @@
       <p:bldP spid="60" grpId="0"/>
       <p:bldP spid="60" grpId="1"/>
     </p:bldLst>
-  </p:timing>
-</p:sld>
-</file>
-
-<file path=ppt/slides/slide4.xml><?xml version="1.0" encoding="utf-8"?>
-<p:sld xmlns:a="http://schemas.openxmlformats.org/drawingml/2006/main" xmlns:r="http://schemas.openxmlformats.org/officeDocument/2006/relationships" xmlns:p="http://schemas.openxmlformats.org/presentationml/2006/main">
-  <p:cSld>
-    <p:spTree>
-      <p:nvGrpSpPr>
-        <p:cNvPr id="1" name=""/>
-        <p:cNvGrpSpPr/>
-        <p:nvPr/>
-      </p:nvGrpSpPr>
-      <p:grpSpPr>
-        <a:xfrm>
-          <a:off x="0" y="0"/>
-          <a:ext cx="0" cy="0"/>
-          <a:chOff x="0" y="0"/>
-          <a:chExt cx="0" cy="0"/>
-        </a:xfrm>
-      </p:grpSpPr>
-      <p:sp>
-        <p:nvSpPr>
-          <p:cNvPr id="2" name="Title 1"/>
-          <p:cNvSpPr>
-            <a:spLocks noGrp="1"/>
-          </p:cNvSpPr>
-          <p:nvPr>
-            <p:ph type="title"/>
-          </p:nvPr>
-        </p:nvSpPr>
-        <p:spPr/>
-        <p:txBody>
-          <a:bodyPr/>
-          <a:lstStyle/>
-          <a:p>
-            <a:r>
-              <a:rPr lang="en-US" dirty="0" smtClean="0"/>
-              <a:t>Stock Concept Example</a:t>
-            </a:r>
-            <a:endParaRPr lang="en-US" dirty="0"/>
-          </a:p>
-        </p:txBody>
-      </p:sp>
-      <p:sp>
-        <p:nvSpPr>
-          <p:cNvPr id="4" name="Footer Placeholder 3"/>
-          <p:cNvSpPr>
-            <a:spLocks noGrp="1"/>
-          </p:cNvSpPr>
-          <p:nvPr>
-            <p:ph type="ftr" sz="quarter" idx="10"/>
-          </p:nvPr>
-        </p:nvSpPr>
-        <p:spPr/>
-        <p:txBody>
-          <a:bodyPr/>
-          <a:lstStyle/>
-          <a:p>
-            <a:pPr>
-              <a:defRPr/>
-            </a:pPr>
-            <a:r>
-              <a:rPr lang="en-US" smtClean="0"/>
-              <a:t>Stock Concept</a:t>
-            </a:r>
-            <a:endParaRPr lang="en-US"/>
-          </a:p>
-        </p:txBody>
-      </p:sp>
-      <p:sp>
-        <p:nvSpPr>
-          <p:cNvPr id="5" name="Slide Number Placeholder 4"/>
-          <p:cNvSpPr>
-            <a:spLocks noGrp="1"/>
-          </p:cNvSpPr>
-          <p:nvPr>
-            <p:ph type="sldNum" sz="quarter" idx="11"/>
-          </p:nvPr>
-        </p:nvSpPr>
-        <p:spPr/>
-        <p:txBody>
-          <a:bodyPr/>
-          <a:lstStyle/>
-          <a:p>
-            <a:pPr>
-              <a:defRPr/>
-            </a:pPr>
-            <a:fld id="{A4C5663D-8A97-4D07-AE54-B897400713C4}" type="slidenum">
-              <a:rPr lang="en-US" smtClean="0"/>
-              <a:pPr>
-                <a:defRPr/>
-              </a:pPr>
-              <a:t>4</a:t>
-            </a:fld>
-            <a:endParaRPr lang="en-US"/>
-          </a:p>
-        </p:txBody>
-      </p:sp>
-      <p:pic>
-        <p:nvPicPr>
-          <p:cNvPr id="6" name="Picture 5"/>
-          <p:cNvPicPr>
-            <a:picLocks noChangeAspect="1"/>
-          </p:cNvPicPr>
-          <p:nvPr/>
-        </p:nvPicPr>
-        <p:blipFill>
-          <a:blip r:embed="rId2"/>
-          <a:stretch>
-            <a:fillRect/>
-          </a:stretch>
-        </p:blipFill>
-        <p:spPr>
-          <a:xfrm>
-            <a:off x="1380816" y="980209"/>
-            <a:ext cx="6380779" cy="4797425"/>
-          </a:xfrm>
-          <a:prstGeom prst="rect">
-            <a:avLst/>
-          </a:prstGeom>
-        </p:spPr>
-      </p:pic>
-      <p:pic>
-        <p:nvPicPr>
-          <p:cNvPr id="8" name="Picture 7"/>
-          <p:cNvPicPr>
-            <a:picLocks noChangeAspect="1"/>
-          </p:cNvPicPr>
-          <p:nvPr/>
-        </p:nvPicPr>
-        <p:blipFill>
-          <a:blip r:embed="rId3"/>
-          <a:stretch>
-            <a:fillRect/>
-          </a:stretch>
-        </p:blipFill>
-        <p:spPr>
-          <a:xfrm>
-            <a:off x="380691" y="6065374"/>
-            <a:ext cx="8077509" cy="716426"/>
-          </a:xfrm>
-          <a:prstGeom prst="rect">
-            <a:avLst/>
-          </a:prstGeom>
-        </p:spPr>
-      </p:pic>
-    </p:spTree>
-    <p:extLst>
-      <p:ext uri="{BB962C8B-B14F-4D97-AF65-F5344CB8AC3E}">
-        <p14:creationId xmlns:p14="http://schemas.microsoft.com/office/powerpoint/2010/main" val="3907378598"/>
-      </p:ext>
-    </p:extLst>
-  </p:cSld>
-  <p:clrMapOvr>
-    <a:masterClrMapping/>
-  </p:clrMapOvr>
-  <p:timing>
-    <p:tnLst>
-      <p:par>
-        <p:cTn id="1" dur="indefinite" restart="never" nodeType="tmRoot"/>
-      </p:par>
-    </p:tnLst>
-  </p:timing>
-</p:sld>
-</file>
-
-<file path=ppt/slides/slide5.xml><?xml version="1.0" encoding="utf-8"?>
-<p:sld xmlns:a="http://schemas.openxmlformats.org/drawingml/2006/main" xmlns:r="http://schemas.openxmlformats.org/officeDocument/2006/relationships" xmlns:p="http://schemas.openxmlformats.org/presentationml/2006/main">
-  <p:cSld>
-    <p:spTree>
-      <p:nvGrpSpPr>
-        <p:cNvPr id="1" name=""/>
-        <p:cNvGrpSpPr/>
-        <p:nvPr/>
-      </p:nvGrpSpPr>
-      <p:grpSpPr>
-        <a:xfrm>
-          <a:off x="0" y="0"/>
-          <a:ext cx="0" cy="0"/>
-          <a:chOff x="0" y="0"/>
-          <a:chExt cx="0" cy="0"/>
-        </a:xfrm>
-      </p:grpSpPr>
-      <p:sp>
-        <p:nvSpPr>
-          <p:cNvPr id="2" name="Title 1"/>
-          <p:cNvSpPr>
-            <a:spLocks noGrp="1"/>
-          </p:cNvSpPr>
-          <p:nvPr>
-            <p:ph type="title"/>
-          </p:nvPr>
-        </p:nvSpPr>
-        <p:spPr/>
-        <p:txBody>
-          <a:bodyPr/>
-          <a:lstStyle/>
-          <a:p>
-            <a:r>
-              <a:rPr lang="en-US" dirty="0" smtClean="0"/>
-              <a:t>Stock Concept Example</a:t>
-            </a:r>
-            <a:endParaRPr lang="en-US" dirty="0"/>
-          </a:p>
-        </p:txBody>
-      </p:sp>
-      <p:sp>
-        <p:nvSpPr>
-          <p:cNvPr id="4" name="Footer Placeholder 3"/>
-          <p:cNvSpPr>
-            <a:spLocks noGrp="1"/>
-          </p:cNvSpPr>
-          <p:nvPr>
-            <p:ph type="ftr" sz="quarter" idx="10"/>
-          </p:nvPr>
-        </p:nvSpPr>
-        <p:spPr/>
-        <p:txBody>
-          <a:bodyPr/>
-          <a:lstStyle/>
-          <a:p>
-            <a:pPr>
-              <a:defRPr/>
-            </a:pPr>
-            <a:r>
-              <a:rPr lang="en-US" smtClean="0"/>
-              <a:t>Stock Concept</a:t>
-            </a:r>
-            <a:endParaRPr lang="en-US"/>
-          </a:p>
-        </p:txBody>
-      </p:sp>
-      <p:sp>
-        <p:nvSpPr>
-          <p:cNvPr id="5" name="Slide Number Placeholder 4"/>
-          <p:cNvSpPr>
-            <a:spLocks noGrp="1"/>
-          </p:cNvSpPr>
-          <p:nvPr>
-            <p:ph type="sldNum" sz="quarter" idx="11"/>
-          </p:nvPr>
-        </p:nvSpPr>
-        <p:spPr/>
-        <p:txBody>
-          <a:bodyPr/>
-          <a:lstStyle/>
-          <a:p>
-            <a:pPr>
-              <a:defRPr/>
-            </a:pPr>
-            <a:fld id="{A4C5663D-8A97-4D07-AE54-B897400713C4}" type="slidenum">
-              <a:rPr lang="en-US" smtClean="0"/>
-              <a:pPr>
-                <a:defRPr/>
-              </a:pPr>
-              <a:t>5</a:t>
-            </a:fld>
-            <a:endParaRPr lang="en-US"/>
-          </a:p>
-        </p:txBody>
-      </p:sp>
-      <p:pic>
-        <p:nvPicPr>
-          <p:cNvPr id="3" name="Picture 2"/>
-          <p:cNvPicPr>
-            <a:picLocks noChangeAspect="1"/>
-          </p:cNvPicPr>
-          <p:nvPr/>
-        </p:nvPicPr>
-        <p:blipFill>
-          <a:blip r:embed="rId2"/>
-          <a:stretch>
-            <a:fillRect/>
-          </a:stretch>
-        </p:blipFill>
-        <p:spPr>
-          <a:xfrm>
-            <a:off x="65088" y="990600"/>
-            <a:ext cx="8986477" cy="5503147"/>
-          </a:xfrm>
-          <a:prstGeom prst="rect">
-            <a:avLst/>
-          </a:prstGeom>
-        </p:spPr>
-      </p:pic>
-      <p:sp>
-        <p:nvSpPr>
-          <p:cNvPr id="8" name="Rectangle 7"/>
-          <p:cNvSpPr/>
-          <p:nvPr/>
-        </p:nvSpPr>
-        <p:spPr>
-          <a:xfrm>
-            <a:off x="3276600" y="990600"/>
-            <a:ext cx="5486400" cy="4724400"/>
-          </a:xfrm>
-          <a:prstGeom prst="rect">
-            <a:avLst/>
-          </a:prstGeom>
-          <a:solidFill>
-            <a:schemeClr val="bg1"/>
-          </a:solidFill>
-          <a:ln>
-            <a:noFill/>
-          </a:ln>
-        </p:spPr>
-        <p:style>
-          <a:lnRef idx="2">
-            <a:schemeClr val="accent1">
-              <a:shade val="50000"/>
-            </a:schemeClr>
-          </a:lnRef>
-          <a:fillRef idx="1">
-            <a:schemeClr val="accent1"/>
-          </a:fillRef>
-          <a:effectRef idx="0">
-            <a:schemeClr val="accent1"/>
-          </a:effectRef>
-          <a:fontRef idx="minor">
-            <a:schemeClr val="lt1"/>
-          </a:fontRef>
-        </p:style>
-        <p:txBody>
-          <a:bodyPr rtlCol="0" anchor="ctr"/>
-          <a:lstStyle/>
-          <a:p>
-            <a:pPr algn="ctr"/>
-            <a:endParaRPr lang="en-US"/>
-          </a:p>
-        </p:txBody>
-      </p:sp>
-      <p:sp>
-        <p:nvSpPr>
-          <p:cNvPr id="9" name="Rectangle 8"/>
-          <p:cNvSpPr/>
-          <p:nvPr/>
-        </p:nvSpPr>
-        <p:spPr>
-          <a:xfrm>
-            <a:off x="685800" y="3255818"/>
-            <a:ext cx="2590800" cy="2209800"/>
-          </a:xfrm>
-          <a:prstGeom prst="rect">
-            <a:avLst/>
-          </a:prstGeom>
-          <a:solidFill>
-            <a:schemeClr val="bg1"/>
-          </a:solidFill>
-          <a:ln>
-            <a:noFill/>
-          </a:ln>
-        </p:spPr>
-        <p:style>
-          <a:lnRef idx="2">
-            <a:schemeClr val="accent1">
-              <a:shade val="50000"/>
-            </a:schemeClr>
-          </a:lnRef>
-          <a:fillRef idx="1">
-            <a:schemeClr val="accent1"/>
-          </a:fillRef>
-          <a:effectRef idx="0">
-            <a:schemeClr val="accent1"/>
-          </a:effectRef>
-          <a:fontRef idx="minor">
-            <a:schemeClr val="lt1"/>
-          </a:fontRef>
-        </p:style>
-        <p:txBody>
-          <a:bodyPr rtlCol="0" anchor="ctr"/>
-          <a:lstStyle/>
-          <a:p>
-            <a:pPr algn="ctr"/>
-            <a:endParaRPr lang="en-US"/>
-          </a:p>
-        </p:txBody>
-      </p:sp>
-    </p:spTree>
-    <p:extLst>
-      <p:ext uri="{BB962C8B-B14F-4D97-AF65-F5344CB8AC3E}">
-        <p14:creationId xmlns:p14="http://schemas.microsoft.com/office/powerpoint/2010/main" val="2932354022"/>
-      </p:ext>
-    </p:extLst>
-  </p:cSld>
-  <p:clrMapOvr>
-    <a:masterClrMapping/>
-  </p:clrMapOvr>
-  <p:timing>
-    <p:tnLst>
-      <p:par>
-        <p:cTn id="1" dur="indefinite" restart="never" nodeType="tmRoot">
-          <p:childTnLst>
-            <p:seq concurrent="1" nextAc="seek">
-              <p:cTn id="2" dur="indefinite" nodeType="mainSeq">
-                <p:childTnLst>
-                  <p:par>
-                    <p:cTn id="3" fill="hold">
-                      <p:stCondLst>
-                        <p:cond delay="indefinite"/>
-                      </p:stCondLst>
-                      <p:childTnLst>
-                        <p:par>
-                          <p:cTn id="4" fill="hold">
-                            <p:stCondLst>
-                              <p:cond delay="0"/>
-                            </p:stCondLst>
-                            <p:childTnLst>
-                              <p:par>
-                                <p:cTn id="5" presetID="1" presetClass="exit" presetSubtype="0" fill="hold" grpId="0" nodeType="clickEffect">
-                                  <p:stCondLst>
-                                    <p:cond delay="0"/>
-                                  </p:stCondLst>
-                                  <p:childTnLst>
-                                    <p:set>
-                                      <p:cBhvr>
-                                        <p:cTn id="6" dur="1" fill="hold">
-                                          <p:stCondLst>
-                                            <p:cond delay="0"/>
-                                          </p:stCondLst>
-                                        </p:cTn>
-                                        <p:tgtEl>
-                                          <p:spTgt spid="9"/>
-                                        </p:tgtEl>
-                                        <p:attrNameLst>
-                                          <p:attrName>style.visibility</p:attrName>
-                                        </p:attrNameLst>
-                                      </p:cBhvr>
-                                      <p:to>
-                                        <p:strVal val="hidden"/>
-                                      </p:to>
-                                    </p:set>
-                                  </p:childTnLst>
-                                </p:cTn>
-                              </p:par>
-                            </p:childTnLst>
-                          </p:cTn>
-                        </p:par>
-                      </p:childTnLst>
-                    </p:cTn>
-                  </p:par>
-                  <p:par>
-                    <p:cTn id="7" fill="hold">
-                      <p:stCondLst>
-                        <p:cond delay="indefinite"/>
-                      </p:stCondLst>
-                      <p:childTnLst>
-                        <p:par>
-                          <p:cTn id="8" fill="hold">
-                            <p:stCondLst>
-                              <p:cond delay="0"/>
-                            </p:stCondLst>
-                            <p:childTnLst>
-                              <p:par>
-                                <p:cTn id="9" presetID="1" presetClass="exit" presetSubtype="0" fill="hold" grpId="0" nodeType="clickEffect">
-                                  <p:stCondLst>
-                                    <p:cond delay="0"/>
-                                  </p:stCondLst>
-                                  <p:childTnLst>
-                                    <p:set>
-                                      <p:cBhvr>
-                                        <p:cTn id="10" dur="1" fill="hold">
-                                          <p:stCondLst>
-                                            <p:cond delay="0"/>
-                                          </p:stCondLst>
-                                        </p:cTn>
-                                        <p:tgtEl>
-                                          <p:spTgt spid="8"/>
-                                        </p:tgtEl>
-                                        <p:attrNameLst>
-                                          <p:attrName>style.visibility</p:attrName>
-                                        </p:attrNameLst>
-                                      </p:cBhvr>
-                                      <p:to>
-                                        <p:strVal val="hidden"/>
-                                      </p:to>
-                                    </p:set>
-                                  </p:childTnLst>
-                                </p:cTn>
-                              </p:par>
-                            </p:childTnLst>
-                          </p:cTn>
-                        </p:par>
-                      </p:childTnLst>
-                    </p:cTn>
-                  </p:par>
-                </p:childTnLst>
-              </p:cTn>
-              <p:prevCondLst>
-                <p:cond evt="onPrev" delay="0">
-                  <p:tgtEl>
-                    <p:sldTgt/>
-                  </p:tgtEl>
-                </p:cond>
-              </p:prevCondLst>
-              <p:nextCondLst>
-                <p:cond evt="onNext" delay="0">
-                  <p:tgtEl>
-                    <p:sldTgt/>
-                  </p:tgtEl>
-                </p:cond>
-              </p:nextCondLst>
-            </p:seq>
-          </p:childTnLst>
-        </p:cTn>
-      </p:par>
-    </p:tnLst>
-    <p:bldLst>
-      <p:bldP spid="8" grpId="0" animBg="1"/>
-      <p:bldP spid="9" grpId="0" animBg="1"/>
-    </p:bldLst>
-  </p:timing>
-</p:sld>
-</file>
-
-<file path=ppt/slides/slide6.xml><?xml version="1.0" encoding="utf-8"?>
-<p:sld xmlns:a="http://schemas.openxmlformats.org/drawingml/2006/main" xmlns:r="http://schemas.openxmlformats.org/officeDocument/2006/relationships" xmlns:p="http://schemas.openxmlformats.org/presentationml/2006/main">
-  <p:cSld>
-    <p:spTree>
-      <p:nvGrpSpPr>
-        <p:cNvPr id="1" name=""/>
-        <p:cNvGrpSpPr/>
-        <p:nvPr/>
-      </p:nvGrpSpPr>
-      <p:grpSpPr>
-        <a:xfrm>
-          <a:off x="0" y="0"/>
-          <a:ext cx="0" cy="0"/>
-          <a:chOff x="0" y="0"/>
-          <a:chExt cx="0" cy="0"/>
-        </a:xfrm>
-      </p:grpSpPr>
-      <p:sp>
-        <p:nvSpPr>
-          <p:cNvPr id="2" name="Title 1"/>
-          <p:cNvSpPr>
-            <a:spLocks noGrp="1"/>
-          </p:cNvSpPr>
-          <p:nvPr>
-            <p:ph type="title"/>
-          </p:nvPr>
-        </p:nvSpPr>
-        <p:spPr/>
-        <p:txBody>
-          <a:bodyPr/>
-          <a:lstStyle/>
-          <a:p>
-            <a:r>
-              <a:rPr lang="en-US" dirty="0" smtClean="0"/>
-              <a:t>Critique of Stock Concept</a:t>
-            </a:r>
-            <a:endParaRPr lang="en-US" dirty="0"/>
-          </a:p>
-        </p:txBody>
-      </p:sp>
-      <p:sp>
-        <p:nvSpPr>
-          <p:cNvPr id="3" name="Content Placeholder 2"/>
-          <p:cNvSpPr>
-            <a:spLocks noGrp="1"/>
-          </p:cNvSpPr>
-          <p:nvPr>
-            <p:ph idx="1"/>
-          </p:nvPr>
-        </p:nvSpPr>
-        <p:spPr/>
-        <p:txBody>
-          <a:bodyPr/>
-          <a:lstStyle/>
-          <a:p>
-            <a:r>
-              <a:rPr lang="en-US" dirty="0" smtClean="0"/>
-              <a:t>Too narrowly focuses management</a:t>
-            </a:r>
-          </a:p>
-          <a:p>
-            <a:pPr lvl="1"/>
-            <a:r>
-              <a:rPr lang="en-US" dirty="0" smtClean="0"/>
-              <a:t>move towards ecosystem-based approach that considers other species, habitat, etc.</a:t>
-            </a:r>
-          </a:p>
-          <a:p>
-            <a:pPr lvl="2"/>
-            <a:r>
-              <a:rPr lang="en-US" dirty="0" smtClean="0"/>
-              <a:t>but some debate about what this means.</a:t>
-            </a:r>
-          </a:p>
-        </p:txBody>
-      </p:sp>
-      <p:sp>
-        <p:nvSpPr>
-          <p:cNvPr id="4" name="Footer Placeholder 3"/>
-          <p:cNvSpPr>
-            <a:spLocks noGrp="1"/>
-          </p:cNvSpPr>
-          <p:nvPr>
-            <p:ph type="ftr" sz="quarter" idx="10"/>
-          </p:nvPr>
-        </p:nvSpPr>
-        <p:spPr/>
-        <p:txBody>
-          <a:bodyPr/>
-          <a:lstStyle/>
-          <a:p>
-            <a:pPr>
-              <a:defRPr/>
-            </a:pPr>
-            <a:r>
-              <a:rPr lang="en-US" smtClean="0"/>
-              <a:t>Stock Concept</a:t>
-            </a:r>
-            <a:endParaRPr lang="en-US"/>
-          </a:p>
-        </p:txBody>
-      </p:sp>
-      <p:sp>
-        <p:nvSpPr>
-          <p:cNvPr id="5" name="Slide Number Placeholder 4"/>
-          <p:cNvSpPr>
-            <a:spLocks noGrp="1"/>
-          </p:cNvSpPr>
-          <p:nvPr>
-            <p:ph type="sldNum" sz="quarter" idx="11"/>
-          </p:nvPr>
-        </p:nvSpPr>
-        <p:spPr/>
-        <p:txBody>
-          <a:bodyPr/>
-          <a:lstStyle/>
-          <a:p>
-            <a:pPr>
-              <a:defRPr/>
-            </a:pPr>
-            <a:fld id="{A4C5663D-8A97-4D07-AE54-B897400713C4}" type="slidenum">
-              <a:rPr lang="en-US" smtClean="0"/>
-              <a:pPr>
-                <a:defRPr/>
-              </a:pPr>
-              <a:t>6</a:t>
-            </a:fld>
-            <a:endParaRPr lang="en-US"/>
-          </a:p>
-        </p:txBody>
-      </p:sp>
-    </p:spTree>
-    <p:extLst>
-      <p:ext uri="{BB962C8B-B14F-4D97-AF65-F5344CB8AC3E}">
-        <p14:creationId xmlns:p14="http://schemas.microsoft.com/office/powerpoint/2010/main" val="2382811857"/>
-      </p:ext>
-    </p:extLst>
-  </p:cSld>
-  <p:clrMapOvr>
-    <a:masterClrMapping/>
-  </p:clrMapOvr>
-  <p:timing>
-    <p:tnLst>
-      <p:par>
-        <p:cTn id="1" dur="indefinite" restart="never" nodeType="tmRoot"/>
-      </p:par>
-    </p:tnLst>
   </p:timing>
 </p:sld>
 </file>

</xml_diff>